<commit_message>
promise syntax and observable syntax
promise syntax and observable syntax
</commit_message>
<xml_diff>
--- a/Angular2.pptx
+++ b/Angular2.pptx
@@ -5,7 +5,7 @@
     <p:sldMasterId id="2147483648" r:id="rId1"/>
   </p:sldMasterIdLst>
   <p:notesMasterIdLst>
-    <p:notesMasterId r:id="rId31"/>
+    <p:notesMasterId r:id="rId33"/>
   </p:notesMasterIdLst>
   <p:sldIdLst>
     <p:sldId id="316" r:id="rId2"/>
@@ -32,11 +32,13 @@
     <p:sldId id="405" r:id="rId23"/>
     <p:sldId id="400" r:id="rId24"/>
     <p:sldId id="401" r:id="rId25"/>
-    <p:sldId id="402" r:id="rId26"/>
-    <p:sldId id="393" r:id="rId27"/>
-    <p:sldId id="394" r:id="rId28"/>
-    <p:sldId id="395" r:id="rId29"/>
-    <p:sldId id="396" r:id="rId30"/>
+    <p:sldId id="406" r:id="rId26"/>
+    <p:sldId id="407" r:id="rId27"/>
+    <p:sldId id="402" r:id="rId28"/>
+    <p:sldId id="393" r:id="rId29"/>
+    <p:sldId id="394" r:id="rId30"/>
+    <p:sldId id="395" r:id="rId31"/>
+    <p:sldId id="396" r:id="rId32"/>
   </p:sldIdLst>
   <p:sldSz cx="12192000" cy="6858000"/>
   <p:notesSz cx="6858000" cy="9144000"/>
@@ -225,7 +227,7 @@
           <a:p>
             <a:fld id="{6848C585-BF4F-4A51-B926-B9EBAB7722D4}" type="datetimeFigureOut">
               <a:rPr lang="nl-NL" smtClean="0"/>
-              <a:t>24-08-17</a:t>
+              <a:t>02-09-17</a:t>
             </a:fld>
             <a:endParaRPr lang="nl-NL"/>
           </a:p>
@@ -2595,7 +2597,7 @@
             </a:r>
             <a:r>
               <a:rPr lang="en-US" baseline="0" dirty="0" err="1" smtClean="0"/>
-              <a:t>geraagt</a:t>
+              <a:t>gedraagd</a:t>
             </a:r>
             <a:r>
               <a:rPr lang="en-US" baseline="0" dirty="0" smtClean="0"/>
@@ -2713,7 +2715,7 @@
       </p:grpSpPr>
       <p:sp>
         <p:nvSpPr>
-          <p:cNvPr id="2" name="Tijdelijke aanduiding voor dia-afbeelding 1"/>
+          <p:cNvPr id="2" name="Slide Image Placeholder 1"/>
           <p:cNvSpPr>
             <a:spLocks noGrp="1" noRot="1" noChangeAspect="1"/>
           </p:cNvSpPr>
@@ -2725,7 +2727,7 @@
       </p:sp>
       <p:sp>
         <p:nvSpPr>
-          <p:cNvPr id="3" name="Tijdelijke aanduiding voor notities 2"/>
+          <p:cNvPr id="3" name="Notes Placeholder 2"/>
           <p:cNvSpPr>
             <a:spLocks noGrp="1"/>
           </p:cNvSpPr>
@@ -2738,501 +2740,13 @@
           <a:bodyPr/>
           <a:lstStyle/>
           <a:p>
-            <a:pPr marL="0" marR="0" indent="0" algn="l" defTabSz="914400" rtl="0" eaLnBrk="1" fontAlgn="auto" latinLnBrk="0" hangingPunct="1">
-              <a:lnSpc>
-                <a:spcPct val="100000"/>
-              </a:lnSpc>
-              <a:spcBef>
-                <a:spcPts val="0"/>
-              </a:spcBef>
-              <a:spcAft>
-                <a:spcPts val="0"/>
-              </a:spcAft>
-              <a:buClrTx/>
-              <a:buSzTx/>
-              <a:buFontTx/>
-              <a:buNone/>
-              <a:tabLst/>
-              <a:defRPr/>
-            </a:pPr>
-            <a:r>
-              <a:rPr lang="en-US" sz="1200" b="0" i="0" kern="1200" dirty="0" smtClean="0">
-                <a:solidFill>
-                  <a:schemeClr val="tx1"/>
-                </a:solidFill>
-                <a:effectLst/>
-                <a:latin typeface="+mn-lt"/>
-                <a:ea typeface="+mn-ea"/>
-                <a:cs typeface="+mn-cs"/>
-              </a:rPr>
-              <a:t>You </a:t>
-            </a:r>
-            <a:r>
-              <a:rPr lang="en-US" sz="1200" b="1" i="1" kern="1200" dirty="0" smtClean="0">
-                <a:solidFill>
-                  <a:schemeClr val="tx1"/>
-                </a:solidFill>
-                <a:effectLst/>
-                <a:latin typeface="+mn-lt"/>
-                <a:ea typeface="+mn-ea"/>
-                <a:cs typeface="+mn-cs"/>
-              </a:rPr>
-              <a:t>export</a:t>
-            </a:r>
-            <a:r>
-              <a:rPr lang="en-US" sz="1200" b="0" i="0" kern="1200" dirty="0" smtClean="0">
-                <a:solidFill>
-                  <a:schemeClr val="tx1"/>
-                </a:solidFill>
-                <a:effectLst/>
-                <a:latin typeface="+mn-lt"/>
-                <a:ea typeface="+mn-ea"/>
-                <a:cs typeface="+mn-cs"/>
-              </a:rPr>
-              <a:t> the </a:t>
-            </a:r>
-            <a:r>
-              <a:rPr lang="en-US" dirty="0" err="1" smtClean="0"/>
-              <a:t>AppService</a:t>
-            </a:r>
-            <a:r>
-              <a:rPr lang="en-US" sz="1200" b="0" i="0" kern="1200" dirty="0" smtClean="0">
-                <a:solidFill>
-                  <a:schemeClr val="tx1"/>
-                </a:solidFill>
-                <a:effectLst/>
-                <a:latin typeface="+mn-lt"/>
-                <a:ea typeface="+mn-ea"/>
-                <a:cs typeface="+mn-cs"/>
-              </a:rPr>
-              <a:t> class so that you can </a:t>
-            </a:r>
-            <a:r>
-              <a:rPr lang="en-US" sz="1200" b="0" i="1" kern="1200" dirty="0" smtClean="0">
-                <a:solidFill>
-                  <a:schemeClr val="tx1"/>
-                </a:solidFill>
-                <a:effectLst/>
-                <a:latin typeface="+mn-lt"/>
-                <a:ea typeface="+mn-ea"/>
-                <a:cs typeface="+mn-cs"/>
-              </a:rPr>
-              <a:t>import</a:t>
-            </a:r>
-            <a:r>
-              <a:rPr lang="en-US" sz="1200" b="0" i="0" kern="1200" dirty="0" smtClean="0">
-                <a:solidFill>
-                  <a:schemeClr val="tx1"/>
-                </a:solidFill>
-                <a:effectLst/>
-                <a:latin typeface="+mn-lt"/>
-                <a:ea typeface="+mn-ea"/>
-                <a:cs typeface="+mn-cs"/>
-              </a:rPr>
-              <a:t> it into the application that you just created.</a:t>
-            </a:r>
-          </a:p>
-          <a:p>
-            <a:pPr marL="0" marR="0" indent="0" algn="l" defTabSz="914400" rtl="0" eaLnBrk="1" fontAlgn="auto" latinLnBrk="0" hangingPunct="1">
-              <a:lnSpc>
-                <a:spcPct val="100000"/>
-              </a:lnSpc>
-              <a:spcBef>
-                <a:spcPts val="0"/>
-              </a:spcBef>
-              <a:spcAft>
-                <a:spcPts val="0"/>
-              </a:spcAft>
-              <a:buClrTx/>
-              <a:buSzTx/>
-              <a:buFontTx/>
-              <a:buNone/>
-              <a:tabLst/>
-              <a:defRPr/>
-            </a:pPr>
-            <a:endParaRPr lang="en-US" sz="1200" b="0" i="0" kern="1200" dirty="0" smtClean="0">
-              <a:solidFill>
-                <a:schemeClr val="tx1"/>
-              </a:solidFill>
-              <a:effectLst/>
-              <a:latin typeface="+mn-lt"/>
-              <a:ea typeface="+mn-ea"/>
-              <a:cs typeface="+mn-cs"/>
-            </a:endParaRPr>
-          </a:p>
-          <a:p>
-            <a:pPr marL="0" marR="0" indent="0" algn="l" defTabSz="914400" rtl="0" eaLnBrk="1" fontAlgn="auto" latinLnBrk="0" hangingPunct="1">
-              <a:lnSpc>
-                <a:spcPct val="100000"/>
-              </a:lnSpc>
-              <a:spcBef>
-                <a:spcPts val="0"/>
-              </a:spcBef>
-              <a:spcAft>
-                <a:spcPts val="0"/>
-              </a:spcAft>
-              <a:buClrTx/>
-              <a:buSzTx/>
-              <a:buFontTx/>
-              <a:buNone/>
-              <a:tabLst/>
-              <a:defRPr/>
-            </a:pPr>
-            <a:r>
-              <a:rPr lang="en-US" sz="1200" b="0" i="0" kern="1200" dirty="0" smtClean="0">
-                <a:solidFill>
-                  <a:schemeClr val="tx1"/>
-                </a:solidFill>
-                <a:effectLst/>
-                <a:latin typeface="+mn-lt"/>
-                <a:ea typeface="+mn-ea"/>
-                <a:cs typeface="+mn-cs"/>
-              </a:rPr>
-              <a:t>Use @Injectable</a:t>
-            </a:r>
-            <a:r>
-              <a:rPr lang="en-US" sz="1200" b="0" i="0" kern="1200" baseline="0" dirty="0" smtClean="0">
-                <a:solidFill>
-                  <a:schemeClr val="tx1"/>
-                </a:solidFill>
-                <a:effectLst/>
-                <a:latin typeface="+mn-lt"/>
-                <a:ea typeface="+mn-ea"/>
-                <a:cs typeface="+mn-cs"/>
-              </a:rPr>
-              <a:t> </a:t>
-            </a:r>
-            <a:r>
-              <a:rPr lang="en-US" sz="1200" b="0" i="0" kern="1200" baseline="0" dirty="0" smtClean="0">
-                <a:solidFill>
-                  <a:schemeClr val="tx1"/>
-                </a:solidFill>
-                <a:effectLst/>
-                <a:latin typeface="+mn-lt"/>
-                <a:ea typeface="+mn-ea"/>
-                <a:cs typeface="+mn-cs"/>
-                <a:sym typeface="Wingdings" panose="05000000000000000000" pitchFamily="2" charset="2"/>
-              </a:rPr>
-              <a:t>???</a:t>
-            </a:r>
-          </a:p>
-          <a:p>
-            <a:pPr marL="0" marR="0" indent="0" algn="l" defTabSz="914400" rtl="0" eaLnBrk="1" fontAlgn="auto" latinLnBrk="0" hangingPunct="1">
-              <a:lnSpc>
-                <a:spcPct val="100000"/>
-              </a:lnSpc>
-              <a:spcBef>
-                <a:spcPts val="0"/>
-              </a:spcBef>
-              <a:spcAft>
-                <a:spcPts val="0"/>
-              </a:spcAft>
-              <a:buClrTx/>
-              <a:buSzTx/>
-              <a:buFontTx/>
-              <a:buNone/>
-              <a:tabLst/>
-              <a:defRPr/>
-            </a:pPr>
-            <a:endParaRPr lang="en-US" sz="1200" b="0" i="0" kern="1200" baseline="0" dirty="0" smtClean="0">
-              <a:solidFill>
-                <a:schemeClr val="tx1"/>
-              </a:solidFill>
-              <a:effectLst/>
-              <a:latin typeface="+mn-lt"/>
-              <a:ea typeface="+mn-ea"/>
-              <a:cs typeface="+mn-cs"/>
-              <a:sym typeface="Wingdings" panose="05000000000000000000" pitchFamily="2" charset="2"/>
-            </a:endParaRPr>
-          </a:p>
-          <a:p>
-            <a:pPr marL="0" marR="0" indent="0" algn="l" defTabSz="914400" rtl="0" eaLnBrk="1" fontAlgn="auto" latinLnBrk="0" hangingPunct="1">
-              <a:lnSpc>
-                <a:spcPct val="100000"/>
-              </a:lnSpc>
-              <a:spcBef>
-                <a:spcPts val="0"/>
-              </a:spcBef>
-              <a:spcAft>
-                <a:spcPts val="0"/>
-              </a:spcAft>
-              <a:buClrTx/>
-              <a:buSzTx/>
-              <a:buFontTx/>
-              <a:buNone/>
-              <a:tabLst/>
-              <a:defRPr/>
-            </a:pPr>
-            <a:r>
-              <a:rPr lang="en-US" sz="1200" b="0" i="0" kern="1200" baseline="0" dirty="0" smtClean="0">
-                <a:solidFill>
-                  <a:schemeClr val="tx1"/>
-                </a:solidFill>
-                <a:effectLst/>
-                <a:latin typeface="+mn-lt"/>
-                <a:ea typeface="+mn-ea"/>
-                <a:cs typeface="+mn-cs"/>
-                <a:sym typeface="Wingdings" panose="05000000000000000000" pitchFamily="2" charset="2"/>
-              </a:rPr>
-              <a:t>Use </a:t>
-            </a:r>
-            <a:r>
-              <a:rPr lang="en-US" sz="1200" b="0" i="0" kern="1200" baseline="0" dirty="0" smtClean="0">
-                <a:solidFill>
-                  <a:schemeClr val="tx1"/>
-                </a:solidFill>
-                <a:effectLst/>
-                <a:latin typeface="+mn-lt"/>
-                <a:ea typeface="+mn-ea"/>
-                <a:cs typeface="+mn-cs"/>
-                <a:sym typeface="Wingdings" panose="05000000000000000000" pitchFamily="2" charset="2"/>
-              </a:rPr>
-              <a:t>Observable!!!</a:t>
-            </a:r>
-            <a:endParaRPr lang="en-US" sz="1200" b="0" i="0" kern="1200" baseline="0" dirty="0" smtClean="0">
-              <a:solidFill>
-                <a:schemeClr val="tx1"/>
-              </a:solidFill>
-              <a:effectLst/>
-              <a:latin typeface="+mn-lt"/>
-              <a:ea typeface="+mn-ea"/>
-              <a:cs typeface="+mn-cs"/>
-              <a:sym typeface="Wingdings" panose="05000000000000000000" pitchFamily="2" charset="2"/>
-            </a:endParaRPr>
-          </a:p>
-          <a:p>
-            <a:pPr marL="0" marR="0" indent="0" algn="l" defTabSz="914400" rtl="0" eaLnBrk="1" fontAlgn="auto" latinLnBrk="0" hangingPunct="1">
-              <a:lnSpc>
-                <a:spcPct val="100000"/>
-              </a:lnSpc>
-              <a:spcBef>
-                <a:spcPts val="0"/>
-              </a:spcBef>
-              <a:spcAft>
-                <a:spcPts val="0"/>
-              </a:spcAft>
-              <a:buClrTx/>
-              <a:buSzTx/>
-              <a:buFontTx/>
-              <a:buNone/>
-              <a:tabLst/>
-              <a:defRPr/>
-            </a:pPr>
-            <a:endParaRPr lang="en-US" sz="1200" b="0" i="0" kern="1200" baseline="0" dirty="0" smtClean="0">
-              <a:solidFill>
-                <a:schemeClr val="tx1"/>
-              </a:solidFill>
-              <a:effectLst/>
-              <a:latin typeface="+mn-lt"/>
-              <a:ea typeface="+mn-ea"/>
-              <a:cs typeface="+mn-cs"/>
-              <a:sym typeface="Wingdings" panose="05000000000000000000" pitchFamily="2" charset="2"/>
-            </a:endParaRPr>
-          </a:p>
-          <a:p>
-            <a:pPr marL="0" marR="0" indent="0" algn="l" defTabSz="914400" rtl="0" eaLnBrk="1" fontAlgn="auto" latinLnBrk="0" hangingPunct="1">
-              <a:lnSpc>
-                <a:spcPct val="100000"/>
-              </a:lnSpc>
-              <a:spcBef>
-                <a:spcPts val="0"/>
-              </a:spcBef>
-              <a:spcAft>
-                <a:spcPts val="0"/>
-              </a:spcAft>
-              <a:buClrTx/>
-              <a:buSzTx/>
-              <a:buFontTx/>
-              <a:buNone/>
-              <a:tabLst/>
-              <a:defRPr/>
-            </a:pPr>
-            <a:endParaRPr lang="en-US" sz="1200" b="0" i="0" kern="1200" baseline="0" dirty="0" smtClean="0">
-              <a:solidFill>
-                <a:schemeClr val="tx1"/>
-              </a:solidFill>
-              <a:effectLst/>
-              <a:latin typeface="+mn-lt"/>
-              <a:ea typeface="+mn-ea"/>
-              <a:cs typeface="+mn-cs"/>
-              <a:sym typeface="Wingdings" panose="05000000000000000000" pitchFamily="2" charset="2"/>
-            </a:endParaRPr>
-          </a:p>
-          <a:p>
-            <a:pPr marL="0" marR="0" indent="0" algn="l" defTabSz="914400" rtl="0" eaLnBrk="1" fontAlgn="auto" latinLnBrk="0" hangingPunct="1">
-              <a:lnSpc>
-                <a:spcPct val="100000"/>
-              </a:lnSpc>
-              <a:spcBef>
-                <a:spcPts val="0"/>
-              </a:spcBef>
-              <a:spcAft>
-                <a:spcPts val="0"/>
-              </a:spcAft>
-              <a:buClrTx/>
-              <a:buSzTx/>
-              <a:buFontTx/>
-              <a:buNone/>
-              <a:tabLst/>
-              <a:defRPr/>
-            </a:pPr>
-            <a:endParaRPr lang="en-US" sz="1200" b="0" i="0" kern="1200" baseline="0" dirty="0" smtClean="0">
-              <a:solidFill>
-                <a:schemeClr val="tx1"/>
-              </a:solidFill>
-              <a:effectLst/>
-              <a:latin typeface="+mn-lt"/>
-              <a:ea typeface="+mn-ea"/>
-              <a:cs typeface="+mn-cs"/>
-              <a:sym typeface="Wingdings" panose="05000000000000000000" pitchFamily="2" charset="2"/>
-            </a:endParaRPr>
-          </a:p>
-          <a:p>
-            <a:pPr marL="0" marR="0" indent="0" algn="l" defTabSz="914400" rtl="0" eaLnBrk="1" fontAlgn="auto" latinLnBrk="0" hangingPunct="1">
-              <a:lnSpc>
-                <a:spcPct val="100000"/>
-              </a:lnSpc>
-              <a:spcBef>
-                <a:spcPts val="0"/>
-              </a:spcBef>
-              <a:spcAft>
-                <a:spcPts val="0"/>
-              </a:spcAft>
-              <a:buClrTx/>
-              <a:buSzTx/>
-              <a:buFontTx/>
-              <a:buNone/>
-              <a:tabLst/>
-              <a:defRPr/>
-            </a:pPr>
-            <a:endParaRPr lang="en-US" sz="1200" b="0" i="0" kern="1200" baseline="0" dirty="0" smtClean="0">
-              <a:solidFill>
-                <a:schemeClr val="tx1"/>
-              </a:solidFill>
-              <a:effectLst/>
-              <a:latin typeface="+mn-lt"/>
-              <a:ea typeface="+mn-ea"/>
-              <a:cs typeface="+mn-cs"/>
-              <a:sym typeface="Wingdings" panose="05000000000000000000" pitchFamily="2" charset="2"/>
-            </a:endParaRPr>
-          </a:p>
-          <a:p>
-            <a:pPr marL="0" marR="0" indent="0" algn="l" defTabSz="914400" rtl="0" eaLnBrk="1" fontAlgn="auto" latinLnBrk="0" hangingPunct="1">
-              <a:lnSpc>
-                <a:spcPct val="100000"/>
-              </a:lnSpc>
-              <a:spcBef>
-                <a:spcPts val="0"/>
-              </a:spcBef>
-              <a:spcAft>
-                <a:spcPts val="0"/>
-              </a:spcAft>
-              <a:buClrTx/>
-              <a:buSzTx/>
-              <a:buFontTx/>
-              <a:buNone/>
-              <a:tabLst/>
-              <a:defRPr/>
-            </a:pPr>
-            <a:endParaRPr lang="en-US" sz="1200" b="0" i="0" kern="1200" baseline="0" dirty="0" smtClean="0">
-              <a:solidFill>
-                <a:schemeClr val="tx1"/>
-              </a:solidFill>
-              <a:effectLst/>
-              <a:latin typeface="+mn-lt"/>
-              <a:ea typeface="+mn-ea"/>
-              <a:cs typeface="+mn-cs"/>
-              <a:sym typeface="Wingdings" panose="05000000000000000000" pitchFamily="2" charset="2"/>
-            </a:endParaRPr>
-          </a:p>
-          <a:p>
-            <a:pPr marL="0" marR="0" indent="0" algn="l" defTabSz="914400" rtl="0" eaLnBrk="1" fontAlgn="auto" latinLnBrk="0" hangingPunct="1">
-              <a:lnSpc>
-                <a:spcPct val="100000"/>
-              </a:lnSpc>
-              <a:spcBef>
-                <a:spcPts val="0"/>
-              </a:spcBef>
-              <a:spcAft>
-                <a:spcPts val="0"/>
-              </a:spcAft>
-              <a:buClrTx/>
-              <a:buSzTx/>
-              <a:buFontTx/>
-              <a:buNone/>
-              <a:tabLst/>
-              <a:defRPr/>
-            </a:pPr>
-            <a:endParaRPr lang="en-US" sz="1200" b="0" i="0" kern="1200" baseline="0" dirty="0" smtClean="0">
-              <a:solidFill>
-                <a:schemeClr val="tx1"/>
-              </a:solidFill>
-              <a:effectLst/>
-              <a:latin typeface="+mn-lt"/>
-              <a:ea typeface="+mn-ea"/>
-              <a:cs typeface="+mn-cs"/>
-              <a:sym typeface="Wingdings" panose="05000000000000000000" pitchFamily="2" charset="2"/>
-            </a:endParaRPr>
-          </a:p>
-          <a:p>
-            <a:pPr marL="0" marR="0" indent="0" algn="l" defTabSz="914400" rtl="0" eaLnBrk="1" fontAlgn="auto" latinLnBrk="0" hangingPunct="1">
-              <a:lnSpc>
-                <a:spcPct val="100000"/>
-              </a:lnSpc>
-              <a:spcBef>
-                <a:spcPts val="0"/>
-              </a:spcBef>
-              <a:spcAft>
-                <a:spcPts val="0"/>
-              </a:spcAft>
-              <a:buClrTx/>
-              <a:buSzTx/>
-              <a:buFontTx/>
-              <a:buNone/>
-              <a:tabLst/>
-              <a:defRPr/>
-            </a:pPr>
-            <a:endParaRPr lang="en-US" sz="1200" b="0" i="0" kern="1200" baseline="0" dirty="0" smtClean="0">
-              <a:solidFill>
-                <a:schemeClr val="tx1"/>
-              </a:solidFill>
-              <a:effectLst/>
-              <a:latin typeface="+mn-lt"/>
-              <a:ea typeface="+mn-ea"/>
-              <a:cs typeface="+mn-cs"/>
-              <a:sym typeface="Wingdings" panose="05000000000000000000" pitchFamily="2" charset="2"/>
-            </a:endParaRPr>
-          </a:p>
-          <a:p>
-            <a:pPr marL="0" marR="0" indent="0" algn="l" defTabSz="914400" rtl="0" eaLnBrk="1" fontAlgn="auto" latinLnBrk="0" hangingPunct="1">
-              <a:lnSpc>
-                <a:spcPct val="100000"/>
-              </a:lnSpc>
-              <a:spcBef>
-                <a:spcPts val="0"/>
-              </a:spcBef>
-              <a:spcAft>
-                <a:spcPts val="0"/>
-              </a:spcAft>
-              <a:buClrTx/>
-              <a:buSzTx/>
-              <a:buFontTx/>
-              <a:buNone/>
-              <a:tabLst/>
-              <a:defRPr/>
-            </a:pPr>
-            <a:endParaRPr lang="en-US" dirty="0" smtClean="0">
-              <a:effectLst/>
-              <a:latin typeface="Cambria"/>
-              <a:ea typeface="ＭＳ 明朝"/>
-              <a:cs typeface="Times New Roman"/>
-            </a:endParaRPr>
+            <a:endParaRPr lang="en-US" dirty="0"/>
           </a:p>
         </p:txBody>
       </p:sp>
       <p:sp>
         <p:nvSpPr>
-          <p:cNvPr id="4" name="Tijdelijke aanduiding voor dianummer 3"/>
+          <p:cNvPr id="4" name="Slide Number Placeholder 3"/>
           <p:cNvSpPr>
             <a:spLocks noGrp="1"/>
           </p:cNvSpPr>
@@ -3247,7 +2761,7 @@
           <a:p>
             <a:fld id="{59C059BC-4998-4873-8F2D-C8268E612536}" type="slidenum">
               <a:rPr lang="nl-NL" smtClean="0"/>
-              <a:t>25</a:t>
+              <a:t>26</a:t>
             </a:fld>
             <a:endParaRPr lang="nl-NL"/>
           </a:p>
@@ -3256,7 +2770,7 @@
     </p:spTree>
     <p:extLst>
       <p:ext uri="{BB962C8B-B14F-4D97-AF65-F5344CB8AC3E}">
-        <p14:creationId xmlns:p14="http://schemas.microsoft.com/office/powerpoint/2010/main" val="547972139"/>
+        <p14:creationId xmlns:p14="http://schemas.microsoft.com/office/powerpoint/2010/main" val="761643460"/>
       </p:ext>
     </p:extLst>
   </p:cSld>
@@ -3310,11 +2824,472 @@
           <a:bodyPr/>
           <a:lstStyle/>
           <a:p>
-            <a:r>
-              <a:rPr lang="nl-NL" b="1" dirty="0" smtClean="0"/>
-              <a:t>Alternatief voor $Scope  = DI !!!</a:t>
-            </a:r>
-            <a:endParaRPr lang="nl-NL" b="1" dirty="0"/>
+            <a:pPr marL="0" marR="0" indent="0" algn="l" defTabSz="914400" rtl="0" eaLnBrk="1" fontAlgn="auto" latinLnBrk="0" hangingPunct="1">
+              <a:lnSpc>
+                <a:spcPct val="100000"/>
+              </a:lnSpc>
+              <a:spcBef>
+                <a:spcPts val="0"/>
+              </a:spcBef>
+              <a:spcAft>
+                <a:spcPts val="0"/>
+              </a:spcAft>
+              <a:buClrTx/>
+              <a:buSzTx/>
+              <a:buFontTx/>
+              <a:buNone/>
+              <a:tabLst/>
+              <a:defRPr/>
+            </a:pPr>
+            <a:r>
+              <a:rPr lang="en-US" sz="1200" b="0" i="0" kern="1200" dirty="0" smtClean="0">
+                <a:solidFill>
+                  <a:schemeClr val="tx1"/>
+                </a:solidFill>
+                <a:effectLst/>
+                <a:latin typeface="+mn-lt"/>
+                <a:ea typeface="+mn-ea"/>
+                <a:cs typeface="+mn-cs"/>
+              </a:rPr>
+              <a:t>You </a:t>
+            </a:r>
+            <a:r>
+              <a:rPr lang="en-US" sz="1200" b="1" i="1" kern="1200" dirty="0" smtClean="0">
+                <a:solidFill>
+                  <a:schemeClr val="tx1"/>
+                </a:solidFill>
+                <a:effectLst/>
+                <a:latin typeface="+mn-lt"/>
+                <a:ea typeface="+mn-ea"/>
+                <a:cs typeface="+mn-cs"/>
+              </a:rPr>
+              <a:t>export</a:t>
+            </a:r>
+            <a:r>
+              <a:rPr lang="en-US" sz="1200" b="0" i="0" kern="1200" dirty="0" smtClean="0">
+                <a:solidFill>
+                  <a:schemeClr val="tx1"/>
+                </a:solidFill>
+                <a:effectLst/>
+                <a:latin typeface="+mn-lt"/>
+                <a:ea typeface="+mn-ea"/>
+                <a:cs typeface="+mn-cs"/>
+              </a:rPr>
+              <a:t> the </a:t>
+            </a:r>
+            <a:r>
+              <a:rPr lang="en-US" dirty="0" err="1" smtClean="0"/>
+              <a:t>AppService</a:t>
+            </a:r>
+            <a:r>
+              <a:rPr lang="en-US" sz="1200" b="0" i="0" kern="1200" dirty="0" smtClean="0">
+                <a:solidFill>
+                  <a:schemeClr val="tx1"/>
+                </a:solidFill>
+                <a:effectLst/>
+                <a:latin typeface="+mn-lt"/>
+                <a:ea typeface="+mn-ea"/>
+                <a:cs typeface="+mn-cs"/>
+              </a:rPr>
+              <a:t> class so that you can </a:t>
+            </a:r>
+            <a:r>
+              <a:rPr lang="en-US" sz="1200" b="0" i="1" kern="1200" dirty="0" smtClean="0">
+                <a:solidFill>
+                  <a:schemeClr val="tx1"/>
+                </a:solidFill>
+                <a:effectLst/>
+                <a:latin typeface="+mn-lt"/>
+                <a:ea typeface="+mn-ea"/>
+                <a:cs typeface="+mn-cs"/>
+              </a:rPr>
+              <a:t>import</a:t>
+            </a:r>
+            <a:r>
+              <a:rPr lang="en-US" sz="1200" b="0" i="0" kern="1200" dirty="0" smtClean="0">
+                <a:solidFill>
+                  <a:schemeClr val="tx1"/>
+                </a:solidFill>
+                <a:effectLst/>
+                <a:latin typeface="+mn-lt"/>
+                <a:ea typeface="+mn-ea"/>
+                <a:cs typeface="+mn-cs"/>
+              </a:rPr>
+              <a:t> it into the application that you just created.</a:t>
+            </a:r>
+          </a:p>
+          <a:p>
+            <a:pPr marL="0" marR="0" indent="0" algn="l" defTabSz="914400" rtl="0" eaLnBrk="1" fontAlgn="auto" latinLnBrk="0" hangingPunct="1">
+              <a:lnSpc>
+                <a:spcPct val="100000"/>
+              </a:lnSpc>
+              <a:spcBef>
+                <a:spcPts val="0"/>
+              </a:spcBef>
+              <a:spcAft>
+                <a:spcPts val="0"/>
+              </a:spcAft>
+              <a:buClrTx/>
+              <a:buSzTx/>
+              <a:buFontTx/>
+              <a:buNone/>
+              <a:tabLst/>
+              <a:defRPr/>
+            </a:pPr>
+            <a:endParaRPr lang="en-US" sz="1200" b="0" i="0" kern="1200" dirty="0" smtClean="0">
+              <a:solidFill>
+                <a:schemeClr val="tx1"/>
+              </a:solidFill>
+              <a:effectLst/>
+              <a:latin typeface="+mn-lt"/>
+              <a:ea typeface="+mn-ea"/>
+              <a:cs typeface="+mn-cs"/>
+            </a:endParaRPr>
+          </a:p>
+          <a:p>
+            <a:pPr marL="0" marR="0" indent="0" algn="l" defTabSz="914400" rtl="0" eaLnBrk="1" fontAlgn="auto" latinLnBrk="0" hangingPunct="1">
+              <a:lnSpc>
+                <a:spcPct val="100000"/>
+              </a:lnSpc>
+              <a:spcBef>
+                <a:spcPts val="0"/>
+              </a:spcBef>
+              <a:spcAft>
+                <a:spcPts val="0"/>
+              </a:spcAft>
+              <a:buClrTx/>
+              <a:buSzTx/>
+              <a:buFontTx/>
+              <a:buNone/>
+              <a:tabLst/>
+              <a:defRPr/>
+            </a:pPr>
+            <a:r>
+              <a:rPr lang="en-US" sz="1200" b="0" i="0" kern="1200" dirty="0" smtClean="0">
+                <a:solidFill>
+                  <a:schemeClr val="tx1"/>
+                </a:solidFill>
+                <a:effectLst/>
+                <a:latin typeface="+mn-lt"/>
+                <a:ea typeface="+mn-ea"/>
+                <a:cs typeface="+mn-cs"/>
+              </a:rPr>
+              <a:t>Use @Injectable</a:t>
+            </a:r>
+            <a:r>
+              <a:rPr lang="en-US" sz="1200" b="0" i="0" kern="1200" baseline="0" dirty="0" smtClean="0">
+                <a:solidFill>
+                  <a:schemeClr val="tx1"/>
+                </a:solidFill>
+                <a:effectLst/>
+                <a:latin typeface="+mn-lt"/>
+                <a:ea typeface="+mn-ea"/>
+                <a:cs typeface="+mn-cs"/>
+              </a:rPr>
+              <a:t> </a:t>
+            </a:r>
+            <a:r>
+              <a:rPr lang="en-US" sz="1200" b="0" i="0" kern="1200" baseline="0" dirty="0" smtClean="0">
+                <a:solidFill>
+                  <a:schemeClr val="tx1"/>
+                </a:solidFill>
+                <a:effectLst/>
+                <a:latin typeface="+mn-lt"/>
+                <a:ea typeface="+mn-ea"/>
+                <a:cs typeface="+mn-cs"/>
+                <a:sym typeface="Wingdings" panose="05000000000000000000" pitchFamily="2" charset="2"/>
+              </a:rPr>
+              <a:t>???</a:t>
+            </a:r>
+          </a:p>
+          <a:p>
+            <a:pPr marL="0" marR="0" indent="0" algn="l" defTabSz="914400" rtl="0" eaLnBrk="1" fontAlgn="auto" latinLnBrk="0" hangingPunct="1">
+              <a:lnSpc>
+                <a:spcPct val="100000"/>
+              </a:lnSpc>
+              <a:spcBef>
+                <a:spcPts val="0"/>
+              </a:spcBef>
+              <a:spcAft>
+                <a:spcPts val="0"/>
+              </a:spcAft>
+              <a:buClrTx/>
+              <a:buSzTx/>
+              <a:buFontTx/>
+              <a:buNone/>
+              <a:tabLst/>
+              <a:defRPr/>
+            </a:pPr>
+            <a:endParaRPr lang="en-US" sz="1200" b="0" i="0" kern="1200" baseline="0" dirty="0" smtClean="0">
+              <a:solidFill>
+                <a:schemeClr val="tx1"/>
+              </a:solidFill>
+              <a:effectLst/>
+              <a:latin typeface="+mn-lt"/>
+              <a:ea typeface="+mn-ea"/>
+              <a:cs typeface="+mn-cs"/>
+              <a:sym typeface="Wingdings" panose="05000000000000000000" pitchFamily="2" charset="2"/>
+            </a:endParaRPr>
+          </a:p>
+          <a:p>
+            <a:pPr marL="0" marR="0" indent="0" algn="l" defTabSz="914400" rtl="0" eaLnBrk="1" fontAlgn="auto" latinLnBrk="0" hangingPunct="1">
+              <a:lnSpc>
+                <a:spcPct val="100000"/>
+              </a:lnSpc>
+              <a:spcBef>
+                <a:spcPts val="0"/>
+              </a:spcBef>
+              <a:spcAft>
+                <a:spcPts val="0"/>
+              </a:spcAft>
+              <a:buClrTx/>
+              <a:buSzTx/>
+              <a:buFontTx/>
+              <a:buNone/>
+              <a:tabLst/>
+              <a:defRPr/>
+            </a:pPr>
+            <a:r>
+              <a:rPr lang="en-US" sz="1200" b="0" i="0" kern="1200" baseline="0" dirty="0" smtClean="0">
+                <a:solidFill>
+                  <a:schemeClr val="tx1"/>
+                </a:solidFill>
+                <a:effectLst/>
+                <a:latin typeface="+mn-lt"/>
+                <a:ea typeface="+mn-ea"/>
+                <a:cs typeface="+mn-cs"/>
+                <a:sym typeface="Wingdings" panose="05000000000000000000" pitchFamily="2" charset="2"/>
+              </a:rPr>
+              <a:t>Use Observable!!!</a:t>
+            </a:r>
+          </a:p>
+          <a:p>
+            <a:pPr marL="0" marR="0" indent="0" algn="l" defTabSz="914400" rtl="0" eaLnBrk="1" fontAlgn="auto" latinLnBrk="0" hangingPunct="1">
+              <a:lnSpc>
+                <a:spcPct val="100000"/>
+              </a:lnSpc>
+              <a:spcBef>
+                <a:spcPts val="0"/>
+              </a:spcBef>
+              <a:spcAft>
+                <a:spcPts val="0"/>
+              </a:spcAft>
+              <a:buClrTx/>
+              <a:buSzTx/>
+              <a:buFontTx/>
+              <a:buNone/>
+              <a:tabLst/>
+              <a:defRPr/>
+            </a:pPr>
+            <a:endParaRPr lang="en-US" sz="1200" b="0" i="0" kern="1200" baseline="0" dirty="0" smtClean="0">
+              <a:solidFill>
+                <a:schemeClr val="tx1"/>
+              </a:solidFill>
+              <a:effectLst/>
+              <a:latin typeface="+mn-lt"/>
+              <a:ea typeface="+mn-ea"/>
+              <a:cs typeface="+mn-cs"/>
+              <a:sym typeface="Wingdings" panose="05000000000000000000" pitchFamily="2" charset="2"/>
+            </a:endParaRPr>
+          </a:p>
+          <a:p>
+            <a:pPr marL="0" marR="0" indent="0" algn="l" defTabSz="914400" rtl="0" eaLnBrk="1" fontAlgn="auto" latinLnBrk="0" hangingPunct="1">
+              <a:lnSpc>
+                <a:spcPct val="100000"/>
+              </a:lnSpc>
+              <a:spcBef>
+                <a:spcPts val="0"/>
+              </a:spcBef>
+              <a:spcAft>
+                <a:spcPts val="0"/>
+              </a:spcAft>
+              <a:buClrTx/>
+              <a:buSzTx/>
+              <a:buFontTx/>
+              <a:buNone/>
+              <a:tabLst/>
+              <a:defRPr/>
+            </a:pPr>
+            <a:endParaRPr lang="en-US" sz="1200" b="0" i="0" kern="1200" baseline="0" dirty="0" smtClean="0">
+              <a:solidFill>
+                <a:schemeClr val="tx1"/>
+              </a:solidFill>
+              <a:effectLst/>
+              <a:latin typeface="+mn-lt"/>
+              <a:ea typeface="+mn-ea"/>
+              <a:cs typeface="+mn-cs"/>
+              <a:sym typeface="Wingdings" panose="05000000000000000000" pitchFamily="2" charset="2"/>
+            </a:endParaRPr>
+          </a:p>
+          <a:p>
+            <a:pPr marL="0" marR="0" indent="0" algn="l" defTabSz="914400" rtl="0" eaLnBrk="1" fontAlgn="auto" latinLnBrk="0" hangingPunct="1">
+              <a:lnSpc>
+                <a:spcPct val="100000"/>
+              </a:lnSpc>
+              <a:spcBef>
+                <a:spcPts val="0"/>
+              </a:spcBef>
+              <a:spcAft>
+                <a:spcPts val="0"/>
+              </a:spcAft>
+              <a:buClrTx/>
+              <a:buSzTx/>
+              <a:buFontTx/>
+              <a:buNone/>
+              <a:tabLst/>
+              <a:defRPr/>
+            </a:pPr>
+            <a:endParaRPr lang="en-US" sz="1200" b="0" i="0" kern="1200" baseline="0" dirty="0" smtClean="0">
+              <a:solidFill>
+                <a:schemeClr val="tx1"/>
+              </a:solidFill>
+              <a:effectLst/>
+              <a:latin typeface="+mn-lt"/>
+              <a:ea typeface="+mn-ea"/>
+              <a:cs typeface="+mn-cs"/>
+              <a:sym typeface="Wingdings" panose="05000000000000000000" pitchFamily="2" charset="2"/>
+            </a:endParaRPr>
+          </a:p>
+          <a:p>
+            <a:pPr marL="0" marR="0" indent="0" algn="l" defTabSz="914400" rtl="0" eaLnBrk="1" fontAlgn="auto" latinLnBrk="0" hangingPunct="1">
+              <a:lnSpc>
+                <a:spcPct val="100000"/>
+              </a:lnSpc>
+              <a:spcBef>
+                <a:spcPts val="0"/>
+              </a:spcBef>
+              <a:spcAft>
+                <a:spcPts val="0"/>
+              </a:spcAft>
+              <a:buClrTx/>
+              <a:buSzTx/>
+              <a:buFontTx/>
+              <a:buNone/>
+              <a:tabLst/>
+              <a:defRPr/>
+            </a:pPr>
+            <a:endParaRPr lang="en-US" sz="1200" b="0" i="0" kern="1200" baseline="0" dirty="0" smtClean="0">
+              <a:solidFill>
+                <a:schemeClr val="tx1"/>
+              </a:solidFill>
+              <a:effectLst/>
+              <a:latin typeface="+mn-lt"/>
+              <a:ea typeface="+mn-ea"/>
+              <a:cs typeface="+mn-cs"/>
+              <a:sym typeface="Wingdings" panose="05000000000000000000" pitchFamily="2" charset="2"/>
+            </a:endParaRPr>
+          </a:p>
+          <a:p>
+            <a:pPr marL="0" marR="0" indent="0" algn="l" defTabSz="914400" rtl="0" eaLnBrk="1" fontAlgn="auto" latinLnBrk="0" hangingPunct="1">
+              <a:lnSpc>
+                <a:spcPct val="100000"/>
+              </a:lnSpc>
+              <a:spcBef>
+                <a:spcPts val="0"/>
+              </a:spcBef>
+              <a:spcAft>
+                <a:spcPts val="0"/>
+              </a:spcAft>
+              <a:buClrTx/>
+              <a:buSzTx/>
+              <a:buFontTx/>
+              <a:buNone/>
+              <a:tabLst/>
+              <a:defRPr/>
+            </a:pPr>
+            <a:endParaRPr lang="en-US" sz="1200" b="0" i="0" kern="1200" baseline="0" dirty="0" smtClean="0">
+              <a:solidFill>
+                <a:schemeClr val="tx1"/>
+              </a:solidFill>
+              <a:effectLst/>
+              <a:latin typeface="+mn-lt"/>
+              <a:ea typeface="+mn-ea"/>
+              <a:cs typeface="+mn-cs"/>
+              <a:sym typeface="Wingdings" panose="05000000000000000000" pitchFamily="2" charset="2"/>
+            </a:endParaRPr>
+          </a:p>
+          <a:p>
+            <a:pPr marL="0" marR="0" indent="0" algn="l" defTabSz="914400" rtl="0" eaLnBrk="1" fontAlgn="auto" latinLnBrk="0" hangingPunct="1">
+              <a:lnSpc>
+                <a:spcPct val="100000"/>
+              </a:lnSpc>
+              <a:spcBef>
+                <a:spcPts val="0"/>
+              </a:spcBef>
+              <a:spcAft>
+                <a:spcPts val="0"/>
+              </a:spcAft>
+              <a:buClrTx/>
+              <a:buSzTx/>
+              <a:buFontTx/>
+              <a:buNone/>
+              <a:tabLst/>
+              <a:defRPr/>
+            </a:pPr>
+            <a:endParaRPr lang="en-US" sz="1200" b="0" i="0" kern="1200" baseline="0" dirty="0" smtClean="0">
+              <a:solidFill>
+                <a:schemeClr val="tx1"/>
+              </a:solidFill>
+              <a:effectLst/>
+              <a:latin typeface="+mn-lt"/>
+              <a:ea typeface="+mn-ea"/>
+              <a:cs typeface="+mn-cs"/>
+              <a:sym typeface="Wingdings" panose="05000000000000000000" pitchFamily="2" charset="2"/>
+            </a:endParaRPr>
+          </a:p>
+          <a:p>
+            <a:pPr marL="0" marR="0" indent="0" algn="l" defTabSz="914400" rtl="0" eaLnBrk="1" fontAlgn="auto" latinLnBrk="0" hangingPunct="1">
+              <a:lnSpc>
+                <a:spcPct val="100000"/>
+              </a:lnSpc>
+              <a:spcBef>
+                <a:spcPts val="0"/>
+              </a:spcBef>
+              <a:spcAft>
+                <a:spcPts val="0"/>
+              </a:spcAft>
+              <a:buClrTx/>
+              <a:buSzTx/>
+              <a:buFontTx/>
+              <a:buNone/>
+              <a:tabLst/>
+              <a:defRPr/>
+            </a:pPr>
+            <a:endParaRPr lang="en-US" sz="1200" b="0" i="0" kern="1200" baseline="0" dirty="0" smtClean="0">
+              <a:solidFill>
+                <a:schemeClr val="tx1"/>
+              </a:solidFill>
+              <a:effectLst/>
+              <a:latin typeface="+mn-lt"/>
+              <a:ea typeface="+mn-ea"/>
+              <a:cs typeface="+mn-cs"/>
+              <a:sym typeface="Wingdings" panose="05000000000000000000" pitchFamily="2" charset="2"/>
+            </a:endParaRPr>
+          </a:p>
+          <a:p>
+            <a:pPr marL="0" marR="0" indent="0" algn="l" defTabSz="914400" rtl="0" eaLnBrk="1" fontAlgn="auto" latinLnBrk="0" hangingPunct="1">
+              <a:lnSpc>
+                <a:spcPct val="100000"/>
+              </a:lnSpc>
+              <a:spcBef>
+                <a:spcPts val="0"/>
+              </a:spcBef>
+              <a:spcAft>
+                <a:spcPts val="0"/>
+              </a:spcAft>
+              <a:buClrTx/>
+              <a:buSzTx/>
+              <a:buFontTx/>
+              <a:buNone/>
+              <a:tabLst/>
+              <a:defRPr/>
+            </a:pPr>
+            <a:endParaRPr lang="en-US" dirty="0" smtClean="0">
+              <a:effectLst/>
+              <a:latin typeface="Cambria"/>
+              <a:ea typeface="ＭＳ 明朝"/>
+              <a:cs typeface="Times New Roman"/>
+            </a:endParaRPr>
           </a:p>
         </p:txBody>
       </p:sp>
@@ -3344,7 +3319,7 @@
     </p:spTree>
     <p:extLst>
       <p:ext uri="{BB962C8B-B14F-4D97-AF65-F5344CB8AC3E}">
-        <p14:creationId xmlns:p14="http://schemas.microsoft.com/office/powerpoint/2010/main" val="131180034"/>
+        <p14:creationId xmlns:p14="http://schemas.microsoft.com/office/powerpoint/2010/main" val="547972139"/>
       </p:ext>
     </p:extLst>
   </p:cSld>
@@ -3981,7 +3956,7 @@
       </p:grpSpPr>
       <p:sp>
         <p:nvSpPr>
-          <p:cNvPr id="2" name="Slide Image Placeholder 1"/>
+          <p:cNvPr id="2" name="Tijdelijke aanduiding voor dia-afbeelding 1"/>
           <p:cNvSpPr>
             <a:spLocks noGrp="1" noRot="1" noChangeAspect="1"/>
           </p:cNvSpPr>
@@ -3993,7 +3968,7 @@
       </p:sp>
       <p:sp>
         <p:nvSpPr>
-          <p:cNvPr id="3" name="Notes Placeholder 2"/>
+          <p:cNvPr id="3" name="Tijdelijke aanduiding voor notities 2"/>
           <p:cNvSpPr>
             <a:spLocks noGrp="1"/>
           </p:cNvSpPr>
@@ -4007,40 +3982,16 @@
           <a:lstStyle/>
           <a:p>
             <a:r>
-              <a:rPr lang="en-US" dirty="0" smtClean="0"/>
-              <a:t>Subscribe/</a:t>
-            </a:r>
-            <a:r>
-              <a:rPr lang="en-US" dirty="0" err="1" smtClean="0"/>
-              <a:t>abonneer</a:t>
-            </a:r>
-            <a:r>
-              <a:rPr lang="en-US" baseline="0" dirty="0" smtClean="0"/>
-              <a:t> op de </a:t>
-            </a:r>
-            <a:r>
-              <a:rPr lang="en-US" baseline="0" dirty="0" err="1" smtClean="0"/>
-              <a:t>te</a:t>
-            </a:r>
-            <a:r>
-              <a:rPr lang="en-US" baseline="0" dirty="0" smtClean="0"/>
-              <a:t> </a:t>
-            </a:r>
-            <a:r>
-              <a:rPr lang="en-US" baseline="0" dirty="0" err="1" smtClean="0"/>
-              <a:t>ontvangen</a:t>
-            </a:r>
-            <a:r>
-              <a:rPr lang="en-US" baseline="0" dirty="0" smtClean="0"/>
-              <a:t> data !!!</a:t>
-            </a:r>
-            <a:endParaRPr lang="en-US" dirty="0"/>
+              <a:rPr lang="nl-NL" b="1" dirty="0" smtClean="0"/>
+              <a:t>Alternatief voor $Scope  = DI !!!</a:t>
+            </a:r>
+            <a:endParaRPr lang="nl-NL" b="1" dirty="0"/>
           </a:p>
         </p:txBody>
       </p:sp>
       <p:sp>
         <p:nvSpPr>
-          <p:cNvPr id="4" name="Slide Number Placeholder 3"/>
+          <p:cNvPr id="4" name="Tijdelijke aanduiding voor dianummer 3"/>
           <p:cNvSpPr>
             <a:spLocks noGrp="1"/>
           </p:cNvSpPr>
@@ -4055,7 +4006,7 @@
           <a:p>
             <a:fld id="{59C059BC-4998-4873-8F2D-C8268E612536}" type="slidenum">
               <a:rPr lang="nl-NL" smtClean="0"/>
-              <a:t>28</a:t>
+              <a:t>29</a:t>
             </a:fld>
             <a:endParaRPr lang="nl-NL"/>
           </a:p>
@@ -4064,7 +4015,7 @@
     </p:spTree>
     <p:extLst>
       <p:ext uri="{BB962C8B-B14F-4D97-AF65-F5344CB8AC3E}">
-        <p14:creationId xmlns:p14="http://schemas.microsoft.com/office/powerpoint/2010/main" val="2147110284"/>
+        <p14:creationId xmlns:p14="http://schemas.microsoft.com/office/powerpoint/2010/main" val="131180034"/>
       </p:ext>
     </p:extLst>
   </p:cSld>
@@ -4118,6 +4069,34 @@
           <a:bodyPr/>
           <a:lstStyle/>
           <a:p>
+            <a:r>
+              <a:rPr lang="en-US" dirty="0" smtClean="0"/>
+              <a:t>Subscribe/</a:t>
+            </a:r>
+            <a:r>
+              <a:rPr lang="en-US" dirty="0" err="1" smtClean="0"/>
+              <a:t>abonneer</a:t>
+            </a:r>
+            <a:r>
+              <a:rPr lang="en-US" baseline="0" dirty="0" smtClean="0"/>
+              <a:t> op de </a:t>
+            </a:r>
+            <a:r>
+              <a:rPr lang="en-US" baseline="0" dirty="0" err="1" smtClean="0"/>
+              <a:t>te</a:t>
+            </a:r>
+            <a:r>
+              <a:rPr lang="en-US" baseline="0" dirty="0" smtClean="0"/>
+              <a:t> </a:t>
+            </a:r>
+            <a:r>
+              <a:rPr lang="en-US" baseline="0" dirty="0" err="1" smtClean="0"/>
+              <a:t>ontvangen</a:t>
+            </a:r>
+            <a:r>
+              <a:rPr lang="en-US" baseline="0" dirty="0" smtClean="0"/>
+              <a:t> data !!!</a:t>
+            </a:r>
             <a:endParaRPr lang="en-US" dirty="0"/>
           </a:p>
         </p:txBody>
@@ -4139,7 +4118,91 @@
           <a:p>
             <a:fld id="{59C059BC-4998-4873-8F2D-C8268E612536}" type="slidenum">
               <a:rPr lang="nl-NL" smtClean="0"/>
-              <a:t>29</a:t>
+              <a:t>30</a:t>
+            </a:fld>
+            <a:endParaRPr lang="nl-NL"/>
+          </a:p>
+        </p:txBody>
+      </p:sp>
+    </p:spTree>
+    <p:extLst>
+      <p:ext uri="{BB962C8B-B14F-4D97-AF65-F5344CB8AC3E}">
+        <p14:creationId xmlns:p14="http://schemas.microsoft.com/office/powerpoint/2010/main" val="2147110284"/>
+      </p:ext>
+    </p:extLst>
+  </p:cSld>
+  <p:clrMapOvr>
+    <a:masterClrMapping/>
+  </p:clrMapOvr>
+</p:notes>
+</file>
+
+<file path=ppt/notesSlides/notesSlide22.xml><?xml version="1.0" encoding="utf-8"?>
+<p:notes xmlns:a="http://schemas.openxmlformats.org/drawingml/2006/main" xmlns:r="http://schemas.openxmlformats.org/officeDocument/2006/relationships" xmlns:p="http://schemas.openxmlformats.org/presentationml/2006/main">
+  <p:cSld>
+    <p:spTree>
+      <p:nvGrpSpPr>
+        <p:cNvPr id="1" name=""/>
+        <p:cNvGrpSpPr/>
+        <p:nvPr/>
+      </p:nvGrpSpPr>
+      <p:grpSpPr>
+        <a:xfrm>
+          <a:off x="0" y="0"/>
+          <a:ext cx="0" cy="0"/>
+          <a:chOff x="0" y="0"/>
+          <a:chExt cx="0" cy="0"/>
+        </a:xfrm>
+      </p:grpSpPr>
+      <p:sp>
+        <p:nvSpPr>
+          <p:cNvPr id="2" name="Slide Image Placeholder 1"/>
+          <p:cNvSpPr>
+            <a:spLocks noGrp="1" noRot="1" noChangeAspect="1"/>
+          </p:cNvSpPr>
+          <p:nvPr>
+            <p:ph type="sldImg"/>
+          </p:nvPr>
+        </p:nvSpPr>
+        <p:spPr/>
+      </p:sp>
+      <p:sp>
+        <p:nvSpPr>
+          <p:cNvPr id="3" name="Notes Placeholder 2"/>
+          <p:cNvSpPr>
+            <a:spLocks noGrp="1"/>
+          </p:cNvSpPr>
+          <p:nvPr>
+            <p:ph type="body" idx="1"/>
+          </p:nvPr>
+        </p:nvSpPr>
+        <p:spPr/>
+        <p:txBody>
+          <a:bodyPr/>
+          <a:lstStyle/>
+          <a:p>
+            <a:endParaRPr lang="en-US" dirty="0"/>
+          </a:p>
+        </p:txBody>
+      </p:sp>
+      <p:sp>
+        <p:nvSpPr>
+          <p:cNvPr id="4" name="Slide Number Placeholder 3"/>
+          <p:cNvSpPr>
+            <a:spLocks noGrp="1"/>
+          </p:cNvSpPr>
+          <p:nvPr>
+            <p:ph type="sldNum" sz="quarter" idx="10"/>
+          </p:nvPr>
+        </p:nvSpPr>
+        <p:spPr/>
+        <p:txBody>
+          <a:bodyPr/>
+          <a:lstStyle/>
+          <a:p>
+            <a:fld id="{59C059BC-4998-4873-8F2D-C8268E612536}" type="slidenum">
+              <a:rPr lang="nl-NL" smtClean="0"/>
+              <a:t>31</a:t>
             </a:fld>
             <a:endParaRPr lang="nl-NL"/>
           </a:p>
@@ -6963,7 +7026,7 @@
           <a:p>
             <a:fld id="{9379F80A-5E69-4003-A4CA-EECDF3CD699D}" type="datetimeFigureOut">
               <a:rPr lang="nl-NL" smtClean="0"/>
-              <a:t>24-08-17</a:t>
+              <a:t>02-09-17</a:t>
             </a:fld>
             <a:endParaRPr lang="nl-NL"/>
           </a:p>
@@ -7133,7 +7196,7 @@
           <a:p>
             <a:fld id="{9379F80A-5E69-4003-A4CA-EECDF3CD699D}" type="datetimeFigureOut">
               <a:rPr lang="nl-NL" smtClean="0"/>
-              <a:t>24-08-17</a:t>
+              <a:t>02-09-17</a:t>
             </a:fld>
             <a:endParaRPr lang="nl-NL"/>
           </a:p>
@@ -7313,7 +7376,7 @@
           <a:p>
             <a:fld id="{9379F80A-5E69-4003-A4CA-EECDF3CD699D}" type="datetimeFigureOut">
               <a:rPr lang="nl-NL" smtClean="0"/>
-              <a:t>24-08-17</a:t>
+              <a:t>02-09-17</a:t>
             </a:fld>
             <a:endParaRPr lang="nl-NL"/>
           </a:p>
@@ -8101,7 +8164,7 @@
           <a:p>
             <a:fld id="{9379F80A-5E69-4003-A4CA-EECDF3CD699D}" type="datetimeFigureOut">
               <a:rPr lang="nl-NL" smtClean="0"/>
-              <a:t>24-08-17</a:t>
+              <a:t>02-09-17</a:t>
             </a:fld>
             <a:endParaRPr lang="nl-NL"/>
           </a:p>
@@ -8347,7 +8410,7 @@
           <a:p>
             <a:fld id="{9379F80A-5E69-4003-A4CA-EECDF3CD699D}" type="datetimeFigureOut">
               <a:rPr lang="nl-NL" smtClean="0"/>
-              <a:t>24-08-17</a:t>
+              <a:t>02-09-17</a:t>
             </a:fld>
             <a:endParaRPr lang="nl-NL"/>
           </a:p>
@@ -8579,7 +8642,7 @@
           <a:p>
             <a:fld id="{9379F80A-5E69-4003-A4CA-EECDF3CD699D}" type="datetimeFigureOut">
               <a:rPr lang="nl-NL" smtClean="0"/>
-              <a:t>24-08-17</a:t>
+              <a:t>02-09-17</a:t>
             </a:fld>
             <a:endParaRPr lang="nl-NL"/>
           </a:p>
@@ -8946,7 +9009,7 @@
           <a:p>
             <a:fld id="{9379F80A-5E69-4003-A4CA-EECDF3CD699D}" type="datetimeFigureOut">
               <a:rPr lang="nl-NL" smtClean="0"/>
-              <a:t>24-08-17</a:t>
+              <a:t>02-09-17</a:t>
             </a:fld>
             <a:endParaRPr lang="nl-NL"/>
           </a:p>
@@ -9064,7 +9127,7 @@
           <a:p>
             <a:fld id="{9379F80A-5E69-4003-A4CA-EECDF3CD699D}" type="datetimeFigureOut">
               <a:rPr lang="nl-NL" smtClean="0"/>
-              <a:t>24-08-17</a:t>
+              <a:t>02-09-17</a:t>
             </a:fld>
             <a:endParaRPr lang="nl-NL"/>
           </a:p>
@@ -9159,7 +9222,7 @@
           <a:p>
             <a:fld id="{9379F80A-5E69-4003-A4CA-EECDF3CD699D}" type="datetimeFigureOut">
               <a:rPr lang="nl-NL" smtClean="0"/>
-              <a:t>24-08-17</a:t>
+              <a:t>02-09-17</a:t>
             </a:fld>
             <a:endParaRPr lang="nl-NL"/>
           </a:p>
@@ -9436,7 +9499,7 @@
           <a:p>
             <a:fld id="{9379F80A-5E69-4003-A4CA-EECDF3CD699D}" type="datetimeFigureOut">
               <a:rPr lang="nl-NL" smtClean="0"/>
-              <a:t>24-08-17</a:t>
+              <a:t>02-09-17</a:t>
             </a:fld>
             <a:endParaRPr lang="nl-NL"/>
           </a:p>
@@ -9689,7 +9752,7 @@
           <a:p>
             <a:fld id="{9379F80A-5E69-4003-A4CA-EECDF3CD699D}" type="datetimeFigureOut">
               <a:rPr lang="nl-NL" smtClean="0"/>
-              <a:t>24-08-17</a:t>
+              <a:t>02-09-17</a:t>
             </a:fld>
             <a:endParaRPr lang="nl-NL"/>
           </a:p>
@@ -9930,7 +9993,7 @@
           <a:p>
             <a:fld id="{9379F80A-5E69-4003-A4CA-EECDF3CD699D}" type="datetimeFigureOut">
               <a:rPr lang="nl-NL" smtClean="0"/>
-              <a:t>24-08-17</a:t>
+              <a:t>02-09-17</a:t>
             </a:fld>
             <a:endParaRPr lang="nl-NL"/>
           </a:p>
@@ -13573,21 +13636,8 @@
                   <a:srgbClr val="FFC000"/>
                 </a:solidFill>
               </a:rPr>
-              <a:t>Pull </a:t>
-            </a:r>
-            <a:r>
-              <a:rPr lang="nl-NL" sz="2400" b="1" dirty="0" smtClean="0">
-                <a:solidFill>
-                  <a:srgbClr val="FFC000"/>
-                </a:solidFill>
-              </a:rPr>
-              <a:t>mechanisme</a:t>
-            </a:r>
-            <a:endParaRPr lang="nl-NL" sz="2400" b="1" dirty="0" smtClean="0">
-              <a:solidFill>
-                <a:srgbClr val="FFC000"/>
-              </a:solidFill>
-            </a:endParaRPr>
+              <a:t>Pull mechanisme</a:t>
+            </a:r>
           </a:p>
           <a:p>
             <a:pPr algn="ctr"/>
@@ -15685,15 +15735,7 @@
                   <a:srgbClr val="FFC000"/>
                 </a:solidFill>
               </a:rPr>
-              <a:t>Promise </a:t>
-            </a:r>
-            <a:r>
-              <a:rPr lang="en-US" b="1" dirty="0" smtClean="0">
-                <a:solidFill>
-                  <a:srgbClr val="FFC000"/>
-                </a:solidFill>
-              </a:rPr>
-              <a:t>syntax</a:t>
+              <a:t>Promise syntax</a:t>
             </a:r>
             <a:endParaRPr lang="en-US" b="1" dirty="0">
               <a:solidFill>
@@ -16367,7 +16409,7 @@
                   <a:srgbClr val="FFC000"/>
                 </a:solidFill>
               </a:rPr>
-              <a:t> web </a:t>
+              <a:t> </a:t>
             </a:r>
             <a:r>
               <a:rPr lang="nl-NL" sz="1600" b="1" i="1" dirty="0" err="1">
@@ -16375,7 +16417,7 @@
                   <a:srgbClr val="FFC000"/>
                 </a:solidFill>
               </a:rPr>
-              <a:t>api</a:t>
+              <a:t>InMemoryDataService</a:t>
             </a:r>
             <a:r>
               <a:rPr lang="nl-NL" sz="1600" b="1" i="1" dirty="0" smtClean="0">
@@ -17638,6 +17680,13 @@
   <p:clrMapOvr>
     <a:masterClrMapping/>
   </p:clrMapOvr>
+  <p:timing>
+    <p:tnLst>
+      <p:par>
+        <p:cTn id="1" dur="indefinite" restart="never" nodeType="tmRoot"/>
+      </p:par>
+    </p:tnLst>
+  </p:timing>
 </p:sld>
 </file>
 
@@ -17847,11 +17896,6 @@
               </a:rPr>
               <a:t>)</a:t>
             </a:r>
-            <a:endParaRPr lang="nl-NL" sz="2400" b="1" dirty="0" smtClean="0">
-              <a:solidFill>
-                <a:srgbClr val="FFC000"/>
-              </a:solidFill>
-            </a:endParaRPr>
           </a:p>
           <a:p>
             <a:pPr algn="ctr"/>
@@ -18081,6 +18125,13 @@
   <p:clrMapOvr>
     <a:masterClrMapping/>
   </p:clrMapOvr>
+  <p:timing>
+    <p:tnLst>
+      <p:par>
+        <p:cTn id="1" dur="indefinite" restart="never" nodeType="tmRoot"/>
+      </p:par>
+    </p:tnLst>
+  </p:timing>
 </p:sld>
 </file>
 
@@ -18164,6 +18215,472 @@
 </file>
 
 <file path=ppt/slides/slide25.xml><?xml version="1.0" encoding="utf-8"?>
+<p:sld xmlns:a="http://schemas.openxmlformats.org/drawingml/2006/main" xmlns:r="http://schemas.openxmlformats.org/officeDocument/2006/relationships" xmlns:p="http://schemas.openxmlformats.org/presentationml/2006/main">
+  <p:cSld>
+    <p:spTree>
+      <p:nvGrpSpPr>
+        <p:cNvPr id="1" name=""/>
+        <p:cNvGrpSpPr/>
+        <p:nvPr/>
+      </p:nvGrpSpPr>
+      <p:grpSpPr>
+        <a:xfrm>
+          <a:off x="0" y="0"/>
+          <a:ext cx="0" cy="0"/>
+          <a:chOff x="0" y="0"/>
+          <a:chExt cx="0" cy="0"/>
+        </a:xfrm>
+      </p:grpSpPr>
+      <p:sp>
+        <p:nvSpPr>
+          <p:cNvPr id="2" name="Title 1"/>
+          <p:cNvSpPr>
+            <a:spLocks noGrp="1"/>
+          </p:cNvSpPr>
+          <p:nvPr>
+            <p:ph type="title"/>
+          </p:nvPr>
+        </p:nvSpPr>
+        <p:spPr/>
+        <p:txBody>
+          <a:bodyPr/>
+          <a:lstStyle/>
+          <a:p>
+            <a:pPr algn="ctr"/>
+            <a:r>
+              <a:rPr lang="en-US" sz="3200" b="1" dirty="0">
+                <a:solidFill>
+                  <a:srgbClr val="FFC000"/>
+                </a:solidFill>
+              </a:rPr>
+              <a:t>Interactive diagrams of Rx Observables</a:t>
+            </a:r>
+            <a:r>
+              <a:rPr lang="en-US" sz="3200" b="1" dirty="0"/>
+              <a:t/>
+            </a:r>
+            <a:br>
+              <a:rPr lang="en-US" sz="3200" b="1" dirty="0"/>
+            </a:br>
+            <a:endParaRPr lang="en-US" sz="3200" b="1" dirty="0">
+              <a:solidFill>
+                <a:srgbClr val="C00000"/>
+              </a:solidFill>
+            </a:endParaRPr>
+          </a:p>
+        </p:txBody>
+      </p:sp>
+      <p:sp>
+        <p:nvSpPr>
+          <p:cNvPr id="3" name="Rectangle 2"/>
+          <p:cNvSpPr/>
+          <p:nvPr/>
+        </p:nvSpPr>
+        <p:spPr>
+          <a:xfrm>
+            <a:off x="1977081" y="2273643"/>
+            <a:ext cx="5270485" cy="1569660"/>
+          </a:xfrm>
+          <a:prstGeom prst="rect">
+            <a:avLst/>
+          </a:prstGeom>
+        </p:spPr>
+        <p:txBody>
+          <a:bodyPr wrap="square">
+            <a:spAutoFit/>
+          </a:bodyPr>
+          <a:lstStyle/>
+          <a:p>
+            <a:r>
+              <a:rPr lang="en-US" sz="3200" b="1" dirty="0">
+                <a:solidFill>
+                  <a:srgbClr val="C00000"/>
+                </a:solidFill>
+                <a:hlinkClick r:id="rId2"/>
+              </a:rPr>
+              <a:t>http://rxmarbles.com</a:t>
+            </a:r>
+            <a:r>
+              <a:rPr lang="en-US" sz="3200" b="1" dirty="0" smtClean="0">
+                <a:solidFill>
+                  <a:srgbClr val="C00000"/>
+                </a:solidFill>
+                <a:hlinkClick r:id="rId2"/>
+              </a:rPr>
+              <a:t>/</a:t>
+            </a:r>
+            <a:endParaRPr lang="en-US" sz="3200" b="1" dirty="0" smtClean="0">
+              <a:solidFill>
+                <a:srgbClr val="C00000"/>
+              </a:solidFill>
+            </a:endParaRPr>
+          </a:p>
+          <a:p>
+            <a:endParaRPr lang="en-US" sz="3200" b="1" dirty="0">
+              <a:solidFill>
+                <a:srgbClr val="C00000"/>
+              </a:solidFill>
+            </a:endParaRPr>
+          </a:p>
+          <a:p>
+            <a:r>
+              <a:rPr lang="en-US" sz="3200" b="1" dirty="0" err="1" smtClean="0">
+                <a:solidFill>
+                  <a:srgbClr val="C00000"/>
+                </a:solidFill>
+              </a:rPr>
+              <a:t>RXFiddle.net</a:t>
+            </a:r>
+            <a:endParaRPr lang="en-US" sz="3200" b="1" dirty="0">
+              <a:solidFill>
+                <a:srgbClr val="C00000"/>
+              </a:solidFill>
+            </a:endParaRPr>
+          </a:p>
+        </p:txBody>
+      </p:sp>
+    </p:spTree>
+    <p:extLst>
+      <p:ext uri="{BB962C8B-B14F-4D97-AF65-F5344CB8AC3E}">
+        <p14:creationId xmlns:p14="http://schemas.microsoft.com/office/powerpoint/2010/main" val="564970751"/>
+      </p:ext>
+    </p:extLst>
+  </p:cSld>
+  <p:clrMapOvr>
+    <a:masterClrMapping/>
+  </p:clrMapOvr>
+</p:sld>
+</file>
+
+<file path=ppt/slides/slide26.xml><?xml version="1.0" encoding="utf-8"?>
+<p:sld xmlns:a="http://schemas.openxmlformats.org/drawingml/2006/main" xmlns:r="http://schemas.openxmlformats.org/officeDocument/2006/relationships" xmlns:p="http://schemas.openxmlformats.org/presentationml/2006/main">
+  <p:cSld>
+    <p:spTree>
+      <p:nvGrpSpPr>
+        <p:cNvPr id="1" name=""/>
+        <p:cNvGrpSpPr/>
+        <p:nvPr/>
+      </p:nvGrpSpPr>
+      <p:grpSpPr>
+        <a:xfrm>
+          <a:off x="0" y="0"/>
+          <a:ext cx="0" cy="0"/>
+          <a:chOff x="0" y="0"/>
+          <a:chExt cx="0" cy="0"/>
+        </a:xfrm>
+      </p:grpSpPr>
+      <p:sp>
+        <p:nvSpPr>
+          <p:cNvPr id="2" name="Title 1"/>
+          <p:cNvSpPr>
+            <a:spLocks noGrp="1"/>
+          </p:cNvSpPr>
+          <p:nvPr>
+            <p:ph type="title"/>
+          </p:nvPr>
+        </p:nvSpPr>
+        <p:spPr/>
+        <p:txBody>
+          <a:bodyPr/>
+          <a:lstStyle/>
+          <a:p>
+            <a:pPr algn="ctr"/>
+            <a:r>
+              <a:rPr lang="en-US" b="1" dirty="0" smtClean="0">
+                <a:solidFill>
+                  <a:srgbClr val="FFC000"/>
+                </a:solidFill>
+              </a:rPr>
+              <a:t>Observable </a:t>
+            </a:r>
+            <a:r>
+              <a:rPr lang="en-US" b="1" dirty="0" smtClean="0">
+                <a:solidFill>
+                  <a:srgbClr val="FFC000"/>
+                </a:solidFill>
+              </a:rPr>
+              <a:t>syntax</a:t>
+            </a:r>
+            <a:endParaRPr lang="en-US" b="1" dirty="0">
+              <a:solidFill>
+                <a:srgbClr val="FFC000"/>
+              </a:solidFill>
+            </a:endParaRPr>
+          </a:p>
+        </p:txBody>
+      </p:sp>
+      <p:sp>
+        <p:nvSpPr>
+          <p:cNvPr id="3" name="Прямоугольник 2"/>
+          <p:cNvSpPr/>
+          <p:nvPr/>
+        </p:nvSpPr>
+        <p:spPr>
+          <a:xfrm>
+            <a:off x="1831012" y="2086104"/>
+            <a:ext cx="8529975" cy="4939814"/>
+          </a:xfrm>
+          <a:prstGeom prst="rect">
+            <a:avLst/>
+          </a:prstGeom>
+        </p:spPr>
+        <p:txBody>
+          <a:bodyPr wrap="square">
+            <a:spAutoFit/>
+          </a:bodyPr>
+          <a:lstStyle/>
+          <a:p>
+            <a:pPr algn="ctr"/>
+            <a:r>
+              <a:rPr lang="nl-NL" sz="2400" dirty="0" smtClean="0"/>
+              <a:t>l</a:t>
+            </a:r>
+            <a:r>
+              <a:rPr lang="nl-NL" sz="2400" dirty="0" smtClean="0"/>
+              <a:t>et </a:t>
+            </a:r>
+            <a:r>
+              <a:rPr lang="nl-NL" sz="2400" b="1" dirty="0" smtClean="0">
+                <a:solidFill>
+                  <a:schemeClr val="accent2"/>
+                </a:solidFill>
+              </a:rPr>
+              <a:t>source </a:t>
+            </a:r>
+            <a:r>
+              <a:rPr lang="nl-NL" sz="2400" dirty="0" smtClean="0"/>
+              <a:t>= </a:t>
+            </a:r>
+            <a:r>
+              <a:rPr lang="nl-NL" sz="2400" dirty="0" err="1" smtClean="0"/>
+              <a:t>Rx.Observable</a:t>
+            </a:r>
+            <a:endParaRPr lang="nl-NL" sz="2400" dirty="0" smtClean="0"/>
+          </a:p>
+          <a:p>
+            <a:pPr algn="ctr"/>
+            <a:endParaRPr lang="nl-NL" sz="2400" dirty="0" smtClean="0"/>
+          </a:p>
+          <a:p>
+            <a:pPr algn="ctr"/>
+            <a:r>
+              <a:rPr lang="nl-NL" sz="2400" b="1" dirty="0" smtClean="0"/>
+              <a:t>.</a:t>
+            </a:r>
+            <a:r>
+              <a:rPr lang="nl-NL" sz="2400" b="1" dirty="0" err="1" smtClean="0"/>
+              <a:t>firstOperator</a:t>
+            </a:r>
+            <a:r>
+              <a:rPr lang="nl-NL" sz="2400" b="1" dirty="0" smtClean="0"/>
+              <a:t>()</a:t>
+            </a:r>
+          </a:p>
+          <a:p>
+            <a:pPr algn="ctr"/>
+            <a:endParaRPr lang="nl-NL" sz="2400" b="1" dirty="0" smtClean="0"/>
+          </a:p>
+          <a:p>
+            <a:pPr algn="ctr"/>
+            <a:r>
+              <a:rPr lang="nl-NL" sz="2400" b="1" dirty="0" smtClean="0"/>
+              <a:t>.</a:t>
+            </a:r>
+            <a:r>
+              <a:rPr lang="nl-NL" sz="2400" b="1" dirty="0" err="1" smtClean="0"/>
+              <a:t>moreOperators</a:t>
+            </a:r>
+            <a:r>
+              <a:rPr lang="nl-NL" sz="2400" b="1" dirty="0" smtClean="0"/>
+              <a:t>()</a:t>
+            </a:r>
+          </a:p>
+          <a:p>
+            <a:pPr algn="ctr"/>
+            <a:endParaRPr lang="nl-NL" sz="2400" b="1" dirty="0" smtClean="0"/>
+          </a:p>
+          <a:p>
+            <a:pPr algn="ctr"/>
+            <a:endParaRPr lang="nl-NL" sz="2400" b="1" dirty="0" smtClean="0"/>
+          </a:p>
+          <a:p>
+            <a:pPr algn="ctr"/>
+            <a:endParaRPr lang="nl-NL" sz="2400" b="1" dirty="0"/>
+          </a:p>
+          <a:p>
+            <a:pPr algn="ctr"/>
+            <a:r>
+              <a:rPr lang="nl-NL" sz="2400" b="1" u="sng" dirty="0"/>
+              <a:t>l</a:t>
+            </a:r>
+            <a:r>
+              <a:rPr lang="nl-NL" sz="2400" b="1" u="sng" dirty="0" smtClean="0"/>
+              <a:t>et </a:t>
+            </a:r>
+            <a:r>
+              <a:rPr lang="nl-NL" sz="2400" b="1" u="sng" dirty="0" err="1" smtClean="0">
+                <a:solidFill>
+                  <a:schemeClr val="accent2"/>
+                </a:solidFill>
+              </a:rPr>
+              <a:t>result</a:t>
+            </a:r>
+            <a:r>
+              <a:rPr lang="nl-NL" sz="2400" b="1" u="sng" dirty="0" smtClean="0">
+                <a:solidFill>
+                  <a:schemeClr val="accent2"/>
+                </a:solidFill>
+              </a:rPr>
+              <a:t> </a:t>
+            </a:r>
+            <a:r>
+              <a:rPr lang="nl-NL" sz="2400" b="1" u="sng" dirty="0" smtClean="0"/>
+              <a:t>= </a:t>
+            </a:r>
+            <a:r>
+              <a:rPr lang="nl-NL" sz="2400" b="1" u="sng" dirty="0" err="1" smtClean="0"/>
+              <a:t>source.</a:t>
+            </a:r>
+            <a:r>
+              <a:rPr lang="nl-NL" sz="2400" b="1" u="sng" dirty="0" err="1" smtClean="0">
+                <a:solidFill>
+                  <a:srgbClr val="C00000"/>
+                </a:solidFill>
+              </a:rPr>
+              <a:t>subscribe</a:t>
+            </a:r>
+            <a:r>
+              <a:rPr lang="nl-NL" sz="2400" b="1" u="sng" dirty="0" smtClean="0"/>
+              <a:t>(x =&gt; </a:t>
+            </a:r>
+            <a:r>
+              <a:rPr lang="nl-NL" sz="2400" b="1" u="sng" dirty="0" err="1" smtClean="0"/>
+              <a:t>console.log</a:t>
+            </a:r>
+            <a:r>
+              <a:rPr lang="nl-NL" sz="2400" b="1" u="sng" dirty="0" smtClean="0"/>
+              <a:t>(x))</a:t>
+            </a:r>
+          </a:p>
+          <a:p>
+            <a:pPr algn="ctr"/>
+            <a:endParaRPr lang="nl-NL" sz="2400" dirty="0"/>
+          </a:p>
+          <a:p>
+            <a:pPr>
+              <a:lnSpc>
+                <a:spcPts val="1800"/>
+              </a:lnSpc>
+              <a:spcAft>
+                <a:spcPts val="1800"/>
+              </a:spcAft>
+              <a:tabLst>
+                <a:tab pos="581660" algn="l"/>
+                <a:tab pos="1163320" algn="l"/>
+                <a:tab pos="1744980" algn="l"/>
+                <a:tab pos="2326640" algn="l"/>
+                <a:tab pos="2908300" algn="l"/>
+                <a:tab pos="3489960" algn="l"/>
+                <a:tab pos="4071620" algn="l"/>
+                <a:tab pos="4653280" algn="l"/>
+                <a:tab pos="5234940" algn="l"/>
+                <a:tab pos="5816600" algn="l"/>
+                <a:tab pos="6398260" algn="l"/>
+                <a:tab pos="6979920" algn="l"/>
+                <a:tab pos="7561580" algn="l"/>
+                <a:tab pos="8143240" algn="l"/>
+                <a:tab pos="8724900" algn="l"/>
+                <a:tab pos="9306560" algn="l"/>
+              </a:tabLst>
+            </a:pPr>
+            <a:endParaRPr lang="nl-NL" sz="2400" b="1" dirty="0" smtClean="0">
+              <a:latin typeface="Calibri" panose="020F0502020204030204" pitchFamily="34" charset="0"/>
+              <a:ea typeface="ＭＳ 明朝"/>
+              <a:cs typeface="Courier"/>
+            </a:endParaRPr>
+          </a:p>
+          <a:p>
+            <a:pPr>
+              <a:lnSpc>
+                <a:spcPts val="1800"/>
+              </a:lnSpc>
+              <a:spcAft>
+                <a:spcPts val="1800"/>
+              </a:spcAft>
+              <a:tabLst>
+                <a:tab pos="581660" algn="l"/>
+                <a:tab pos="1163320" algn="l"/>
+                <a:tab pos="1744980" algn="l"/>
+                <a:tab pos="2326640" algn="l"/>
+                <a:tab pos="2908300" algn="l"/>
+                <a:tab pos="3489960" algn="l"/>
+                <a:tab pos="4071620" algn="l"/>
+                <a:tab pos="4653280" algn="l"/>
+                <a:tab pos="5234940" algn="l"/>
+                <a:tab pos="5816600" algn="l"/>
+                <a:tab pos="6398260" algn="l"/>
+                <a:tab pos="6979920" algn="l"/>
+                <a:tab pos="7561580" algn="l"/>
+                <a:tab pos="8143240" algn="l"/>
+                <a:tab pos="8724900" algn="l"/>
+                <a:tab pos="9306560" algn="l"/>
+              </a:tabLst>
+            </a:pPr>
+            <a:endParaRPr lang="nl-NL" sz="2400" b="1" dirty="0" smtClean="0">
+              <a:latin typeface="Calibri" panose="020F0502020204030204" pitchFamily="34" charset="0"/>
+              <a:ea typeface="ＭＳ 明朝"/>
+              <a:cs typeface="Courier"/>
+            </a:endParaRPr>
+          </a:p>
+          <a:p>
+            <a:pPr>
+              <a:lnSpc>
+                <a:spcPts val="1800"/>
+              </a:lnSpc>
+              <a:spcAft>
+                <a:spcPts val="1800"/>
+              </a:spcAft>
+              <a:tabLst>
+                <a:tab pos="581660" algn="l"/>
+                <a:tab pos="1163320" algn="l"/>
+                <a:tab pos="1744980" algn="l"/>
+                <a:tab pos="2326640" algn="l"/>
+                <a:tab pos="2908300" algn="l"/>
+                <a:tab pos="3489960" algn="l"/>
+                <a:tab pos="4071620" algn="l"/>
+                <a:tab pos="4653280" algn="l"/>
+                <a:tab pos="5234940" algn="l"/>
+                <a:tab pos="5816600" algn="l"/>
+                <a:tab pos="6398260" algn="l"/>
+                <a:tab pos="6979920" algn="l"/>
+                <a:tab pos="7561580" algn="l"/>
+                <a:tab pos="8143240" algn="l"/>
+                <a:tab pos="8724900" algn="l"/>
+                <a:tab pos="9306560" algn="l"/>
+              </a:tabLst>
+            </a:pPr>
+            <a:endParaRPr lang="en-US" sz="2400" b="1" dirty="0">
+              <a:latin typeface="Calibri" panose="020F0502020204030204" pitchFamily="34" charset="0"/>
+              <a:ea typeface="ＭＳ 明朝"/>
+              <a:cs typeface="Times New Roman"/>
+            </a:endParaRPr>
+          </a:p>
+        </p:txBody>
+      </p:sp>
+    </p:spTree>
+    <p:extLst>
+      <p:ext uri="{BB962C8B-B14F-4D97-AF65-F5344CB8AC3E}">
+        <p14:creationId xmlns:p14="http://schemas.microsoft.com/office/powerpoint/2010/main" val="1894241632"/>
+      </p:ext>
+    </p:extLst>
+  </p:cSld>
+  <p:clrMapOvr>
+    <a:masterClrMapping/>
+  </p:clrMapOvr>
+</p:sld>
+</file>
+
+<file path=ppt/slides/slide27.xml><?xml version="1.0" encoding="utf-8"?>
 <p:sld xmlns:a="http://schemas.openxmlformats.org/drawingml/2006/main" xmlns:r="http://schemas.openxmlformats.org/officeDocument/2006/relationships" xmlns:p="http://schemas.openxmlformats.org/presentationml/2006/main">
   <p:cSld>
     <p:spTree>
@@ -19842,7 +20359,7 @@
 </p:sld>
 </file>
 
-<file path=ppt/slides/slide26.xml><?xml version="1.0" encoding="utf-8"?>
+<file path=ppt/slides/slide28.xml><?xml version="1.0" encoding="utf-8"?>
 <p:sld xmlns:a="http://schemas.openxmlformats.org/drawingml/2006/main" xmlns:r="http://schemas.openxmlformats.org/officeDocument/2006/relationships" xmlns:p="http://schemas.openxmlformats.org/presentationml/2006/main">
   <p:cSld>
     <p:spTree>
@@ -20194,7 +20711,7 @@
 </p:sld>
 </file>
 
-<file path=ppt/slides/slide27.xml><?xml version="1.0" encoding="utf-8"?>
+<file path=ppt/slides/slide29.xml><?xml version="1.0" encoding="utf-8"?>
 <p:sld xmlns:a="http://schemas.openxmlformats.org/drawingml/2006/main" xmlns:r="http://schemas.openxmlformats.org/officeDocument/2006/relationships" xmlns:p="http://schemas.openxmlformats.org/presentationml/2006/main">
   <p:cSld>
     <p:spTree>
@@ -20593,1300 +21110,6 @@
 </p:sld>
 </file>
 
-<file path=ppt/slides/slide28.xml><?xml version="1.0" encoding="utf-8"?>
-<p:sld xmlns:a="http://schemas.openxmlformats.org/drawingml/2006/main" xmlns:r="http://schemas.openxmlformats.org/officeDocument/2006/relationships" xmlns:p="http://schemas.openxmlformats.org/presentationml/2006/main">
-  <p:cSld>
-    <p:spTree>
-      <p:nvGrpSpPr>
-        <p:cNvPr id="1" name=""/>
-        <p:cNvGrpSpPr/>
-        <p:nvPr/>
-      </p:nvGrpSpPr>
-      <p:grpSpPr>
-        <a:xfrm>
-          <a:off x="0" y="0"/>
-          <a:ext cx="0" cy="0"/>
-          <a:chOff x="0" y="0"/>
-          <a:chExt cx="0" cy="0"/>
-        </a:xfrm>
-      </p:grpSpPr>
-      <p:sp>
-        <p:nvSpPr>
-          <p:cNvPr id="2" name="Title 1"/>
-          <p:cNvSpPr>
-            <a:spLocks noGrp="1"/>
-          </p:cNvSpPr>
-          <p:nvPr>
-            <p:ph type="title"/>
-          </p:nvPr>
-        </p:nvSpPr>
-        <p:spPr/>
-        <p:txBody>
-          <a:bodyPr/>
-          <a:lstStyle/>
-          <a:p>
-            <a:pPr algn="ctr"/>
-            <a:r>
-              <a:rPr lang="nl-NL" b="1" dirty="0" err="1" smtClean="0">
-                <a:solidFill>
-                  <a:srgbClr val="FFC000"/>
-                </a:solidFill>
-              </a:rPr>
-              <a:t>Inject</a:t>
-            </a:r>
-            <a:r>
-              <a:rPr lang="nl-NL" b="1" dirty="0" smtClean="0">
-                <a:solidFill>
-                  <a:srgbClr val="FFC000"/>
-                </a:solidFill>
-              </a:rPr>
-              <a:t> service via the </a:t>
-            </a:r>
-            <a:r>
-              <a:rPr lang="nl-NL" b="1" dirty="0" err="1" smtClean="0">
-                <a:solidFill>
-                  <a:srgbClr val="FFC000"/>
-                </a:solidFill>
-              </a:rPr>
-              <a:t>constructor</a:t>
-            </a:r>
-            <a:endParaRPr lang="nl-NL" b="1" dirty="0">
-              <a:solidFill>
-                <a:srgbClr val="FFC000"/>
-              </a:solidFill>
-            </a:endParaRPr>
-          </a:p>
-        </p:txBody>
-      </p:sp>
-      <p:sp>
-        <p:nvSpPr>
-          <p:cNvPr id="3" name="Content Placeholder 2"/>
-          <p:cNvSpPr>
-            <a:spLocks noGrp="1"/>
-          </p:cNvSpPr>
-          <p:nvPr>
-            <p:ph idx="1"/>
-          </p:nvPr>
-        </p:nvSpPr>
-        <p:spPr>
-          <a:xfrm>
-            <a:off x="3002692" y="1690688"/>
-            <a:ext cx="8452022" cy="5031387"/>
-          </a:xfrm>
-        </p:spPr>
-        <p:txBody>
-          <a:bodyPr>
-            <a:normAutofit fontScale="55000" lnSpcReduction="20000"/>
-          </a:bodyPr>
-          <a:lstStyle/>
-          <a:p>
-            <a:pPr marL="0" indent="0">
-              <a:buNone/>
-            </a:pPr>
-            <a:r>
-              <a:rPr lang="nl-NL" dirty="0" smtClean="0"/>
-              <a:t>export </a:t>
-            </a:r>
-            <a:r>
-              <a:rPr lang="nl-NL" dirty="0"/>
-              <a:t>class </a:t>
-            </a:r>
-            <a:r>
-              <a:rPr lang="nl-NL" dirty="0" err="1"/>
-              <a:t>BooksComponent</a:t>
-            </a:r>
-            <a:r>
-              <a:rPr lang="nl-NL" dirty="0"/>
-              <a:t> {</a:t>
-            </a:r>
-          </a:p>
-          <a:p>
-            <a:pPr marL="0" indent="0">
-              <a:buNone/>
-            </a:pPr>
-            <a:r>
-              <a:rPr lang="nl-NL" dirty="0" smtClean="0"/>
-              <a:t>	</a:t>
-            </a:r>
-            <a:r>
-              <a:rPr lang="nl-NL" dirty="0" err="1" smtClean="0"/>
-              <a:t>books</a:t>
-            </a:r>
-            <a:r>
-              <a:rPr lang="nl-NL" dirty="0"/>
-              <a:t>: </a:t>
-            </a:r>
-            <a:r>
-              <a:rPr lang="nl-NL" dirty="0" err="1"/>
-              <a:t>Book</a:t>
-            </a:r>
-            <a:r>
-              <a:rPr lang="nl-NL" dirty="0"/>
-              <a:t>[] = </a:t>
-            </a:r>
-            <a:r>
-              <a:rPr lang="nl-NL" dirty="0" smtClean="0"/>
-              <a:t>[];</a:t>
-            </a:r>
-          </a:p>
-          <a:p>
-            <a:pPr marL="0" indent="0">
-              <a:buNone/>
-            </a:pPr>
-            <a:r>
-              <a:rPr lang="nl-NL" dirty="0"/>
-              <a:t> </a:t>
-            </a:r>
-            <a:r>
-              <a:rPr lang="nl-NL" dirty="0" smtClean="0"/>
-              <a:t>                 </a:t>
-            </a:r>
-            <a:r>
-              <a:rPr lang="nl-NL" b="1" dirty="0" smtClean="0">
-                <a:solidFill>
-                  <a:schemeClr val="accent6">
-                    <a:lumMod val="50000"/>
-                  </a:schemeClr>
-                </a:solidFill>
-              </a:rPr>
-              <a:t>// </a:t>
-            </a:r>
-            <a:r>
-              <a:rPr lang="nl-NL" b="1" dirty="0" err="1" smtClean="0">
-                <a:solidFill>
-                  <a:schemeClr val="accent6">
-                    <a:lumMod val="50000"/>
-                  </a:schemeClr>
-                </a:solidFill>
-              </a:rPr>
-              <a:t>books</a:t>
-            </a:r>
-            <a:r>
-              <a:rPr lang="nl-NL" b="1" dirty="0">
-                <a:solidFill>
-                  <a:schemeClr val="accent6">
-                    <a:lumMod val="50000"/>
-                  </a:schemeClr>
-                </a:solidFill>
-              </a:rPr>
-              <a:t>: </a:t>
-            </a:r>
-            <a:r>
-              <a:rPr lang="nl-NL" b="1" dirty="0" err="1">
-                <a:solidFill>
-                  <a:schemeClr val="accent6">
-                    <a:lumMod val="50000"/>
-                  </a:schemeClr>
-                </a:solidFill>
-              </a:rPr>
-              <a:t>Observable</a:t>
-            </a:r>
-            <a:r>
-              <a:rPr lang="nl-NL" b="1" dirty="0">
-                <a:solidFill>
-                  <a:schemeClr val="accent6">
-                    <a:lumMod val="50000"/>
-                  </a:schemeClr>
-                </a:solidFill>
-              </a:rPr>
-              <a:t>&lt;</a:t>
-            </a:r>
-            <a:r>
-              <a:rPr lang="nl-NL" b="1" dirty="0" err="1">
-                <a:solidFill>
-                  <a:schemeClr val="accent6">
-                    <a:lumMod val="50000"/>
-                  </a:schemeClr>
-                </a:solidFill>
-              </a:rPr>
-              <a:t>Book</a:t>
-            </a:r>
-            <a:r>
-              <a:rPr lang="nl-NL" b="1" dirty="0" smtClean="0">
-                <a:solidFill>
-                  <a:schemeClr val="accent6">
-                    <a:lumMod val="50000"/>
-                  </a:schemeClr>
-                </a:solidFill>
-              </a:rPr>
-              <a:t>[]&gt;;</a:t>
-            </a:r>
-            <a:endParaRPr lang="nl-NL" b="1" dirty="0">
-              <a:solidFill>
-                <a:schemeClr val="accent6">
-                  <a:lumMod val="50000"/>
-                </a:schemeClr>
-              </a:solidFill>
-            </a:endParaRPr>
-          </a:p>
-          <a:p>
-            <a:pPr marL="0" indent="0">
-              <a:buNone/>
-            </a:pPr>
-            <a:endParaRPr lang="nl-NL" dirty="0" smtClean="0"/>
-          </a:p>
-          <a:p>
-            <a:pPr marL="0" indent="0">
-              <a:buNone/>
-            </a:pPr>
-            <a:r>
-              <a:rPr lang="nl-NL" dirty="0" smtClean="0"/>
-              <a:t>	</a:t>
-            </a:r>
-            <a:r>
-              <a:rPr lang="nl-NL" dirty="0" err="1" smtClean="0"/>
-              <a:t>constructor</a:t>
-            </a:r>
-            <a:r>
-              <a:rPr lang="nl-NL" dirty="0" smtClean="0"/>
-              <a:t>(</a:t>
-            </a:r>
-            <a:r>
-              <a:rPr lang="nl-NL" b="1" dirty="0" smtClean="0">
-                <a:solidFill>
-                  <a:srgbClr val="C00000"/>
-                </a:solidFill>
-              </a:rPr>
-              <a:t>private </a:t>
-            </a:r>
-            <a:r>
-              <a:rPr lang="nl-NL" b="1" dirty="0" err="1">
-                <a:solidFill>
-                  <a:srgbClr val="C00000"/>
-                </a:solidFill>
-              </a:rPr>
-              <a:t>appService</a:t>
-            </a:r>
-            <a:r>
-              <a:rPr lang="nl-NL" b="1" dirty="0">
-                <a:solidFill>
-                  <a:srgbClr val="C00000"/>
-                </a:solidFill>
-              </a:rPr>
-              <a:t>: </a:t>
-            </a:r>
-            <a:r>
-              <a:rPr lang="nl-NL" b="1" dirty="0" err="1">
-                <a:solidFill>
-                  <a:srgbClr val="C00000"/>
-                </a:solidFill>
-              </a:rPr>
-              <a:t>AppService</a:t>
-            </a:r>
-            <a:r>
-              <a:rPr lang="nl-NL" dirty="0" smtClean="0"/>
-              <a:t>) {  }</a:t>
-            </a:r>
-          </a:p>
-          <a:p>
-            <a:pPr marL="0" indent="0">
-              <a:buNone/>
-            </a:pPr>
-            <a:endParaRPr lang="nl-NL" dirty="0"/>
-          </a:p>
-          <a:p>
-            <a:pPr marL="914400" lvl="2" indent="0">
-              <a:buNone/>
-            </a:pPr>
-            <a:r>
-              <a:rPr lang="nl-NL" sz="2600" b="1" dirty="0" err="1" smtClean="0">
-                <a:solidFill>
-                  <a:srgbClr val="C00000"/>
-                </a:solidFill>
-              </a:rPr>
-              <a:t>getBooks</a:t>
-            </a:r>
-            <a:r>
-              <a:rPr lang="nl-NL" sz="2600" dirty="0" smtClean="0"/>
-              <a:t>(): </a:t>
-            </a:r>
-            <a:r>
-              <a:rPr lang="nl-NL" sz="2600" dirty="0" err="1" smtClean="0"/>
-              <a:t>void</a:t>
-            </a:r>
-            <a:r>
-              <a:rPr lang="nl-NL" sz="2600" dirty="0" smtClean="0"/>
-              <a:t> {</a:t>
-            </a:r>
-            <a:endParaRPr lang="nl-NL" sz="2600" dirty="0"/>
-          </a:p>
-          <a:p>
-            <a:pPr marL="914400" lvl="2" indent="0">
-              <a:buNone/>
-            </a:pPr>
-            <a:r>
-              <a:rPr lang="nl-NL" sz="2600" dirty="0"/>
-              <a:t>    </a:t>
-            </a:r>
-            <a:r>
-              <a:rPr lang="nl-NL" sz="2600" dirty="0" smtClean="0"/>
-              <a:t> </a:t>
-            </a:r>
-            <a:r>
-              <a:rPr lang="nl-NL" sz="2600" b="1" dirty="0" err="1" smtClean="0">
-                <a:solidFill>
-                  <a:schemeClr val="accent2"/>
-                </a:solidFill>
-              </a:rPr>
-              <a:t>this.appService</a:t>
-            </a:r>
-            <a:r>
-              <a:rPr lang="nl-NL" sz="2600" dirty="0" err="1" smtClean="0"/>
-              <a:t>.getBooks</a:t>
-            </a:r>
-            <a:r>
-              <a:rPr lang="nl-NL" sz="2600" dirty="0"/>
-              <a:t>().</a:t>
-            </a:r>
-            <a:r>
-              <a:rPr lang="nl-NL" sz="2600" dirty="0" err="1" smtClean="0"/>
-              <a:t>then</a:t>
-            </a:r>
-            <a:r>
-              <a:rPr lang="nl-NL" sz="2600" dirty="0" smtClean="0"/>
-              <a:t>(</a:t>
-            </a:r>
-            <a:r>
-              <a:rPr lang="nl-NL" sz="2600" dirty="0" err="1" smtClean="0"/>
-              <a:t>books</a:t>
-            </a:r>
-            <a:r>
-              <a:rPr lang="nl-NL" sz="2600" dirty="0" smtClean="0"/>
-              <a:t> </a:t>
-            </a:r>
-            <a:r>
-              <a:rPr lang="nl-NL" sz="2600" dirty="0"/>
-              <a:t>=&gt; {</a:t>
-            </a:r>
-          </a:p>
-          <a:p>
-            <a:pPr marL="914400" lvl="2" indent="0">
-              <a:buNone/>
-            </a:pPr>
-            <a:r>
-              <a:rPr lang="nl-NL" sz="2600" dirty="0"/>
-              <a:t>      </a:t>
-            </a:r>
-            <a:r>
-              <a:rPr lang="nl-NL" sz="2600" dirty="0" err="1"/>
-              <a:t>this.books</a:t>
-            </a:r>
-            <a:r>
-              <a:rPr lang="nl-NL" sz="2600" dirty="0"/>
-              <a:t> = </a:t>
-            </a:r>
-            <a:r>
-              <a:rPr lang="nl-NL" sz="2600" dirty="0" err="1"/>
-              <a:t>books</a:t>
-            </a:r>
-            <a:r>
-              <a:rPr lang="nl-NL" sz="2600" dirty="0" smtClean="0"/>
-              <a:t>;</a:t>
-            </a:r>
-            <a:endParaRPr lang="nl-NL" sz="2600" dirty="0"/>
-          </a:p>
-          <a:p>
-            <a:pPr marL="914400" lvl="2" indent="0">
-              <a:buNone/>
-            </a:pPr>
-            <a:r>
-              <a:rPr lang="nl-NL" sz="2600" dirty="0"/>
-              <a:t>    </a:t>
-            </a:r>
-            <a:r>
-              <a:rPr lang="nl-NL" sz="2600" dirty="0" smtClean="0"/>
-              <a:t>});</a:t>
-            </a:r>
-          </a:p>
-          <a:p>
-            <a:pPr marL="914400" lvl="2" indent="0">
-              <a:buNone/>
-            </a:pPr>
-            <a:endParaRPr lang="nl-NL" sz="2600" dirty="0"/>
-          </a:p>
-          <a:p>
-            <a:pPr marL="914400" lvl="2" indent="0">
-              <a:buNone/>
-            </a:pPr>
-            <a:r>
-              <a:rPr lang="nl-NL" sz="2600" b="1" dirty="0" smtClean="0">
-                <a:solidFill>
-                  <a:schemeClr val="accent6">
-                    <a:lumMod val="50000"/>
-                  </a:schemeClr>
-                </a:solidFill>
-              </a:rPr>
-              <a:t>//</a:t>
-            </a:r>
-            <a:r>
-              <a:rPr lang="nl-NL" sz="2600" b="1" dirty="0" err="1" smtClean="0">
-                <a:solidFill>
-                  <a:schemeClr val="accent6">
-                    <a:lumMod val="50000"/>
-                  </a:schemeClr>
-                </a:solidFill>
-              </a:rPr>
-              <a:t>Use</a:t>
-            </a:r>
-            <a:r>
-              <a:rPr lang="nl-NL" sz="2600" b="1" dirty="0" smtClean="0">
-                <a:solidFill>
-                  <a:schemeClr val="accent6">
-                    <a:lumMod val="50000"/>
-                  </a:schemeClr>
-                </a:solidFill>
-              </a:rPr>
-              <a:t> </a:t>
-            </a:r>
-            <a:r>
-              <a:rPr lang="nl-NL" sz="2600" b="1" dirty="0" err="1" smtClean="0">
-                <a:solidFill>
-                  <a:srgbClr val="C00000"/>
-                </a:solidFill>
-              </a:rPr>
-              <a:t>subscribe</a:t>
-            </a:r>
-            <a:r>
-              <a:rPr lang="nl-NL" sz="2600" b="1" dirty="0" smtClean="0">
-                <a:solidFill>
-                  <a:srgbClr val="C00000"/>
-                </a:solidFill>
-              </a:rPr>
-              <a:t> </a:t>
-            </a:r>
-            <a:r>
-              <a:rPr lang="nl-NL" sz="2600" b="1" dirty="0" err="1" smtClean="0">
-                <a:solidFill>
-                  <a:schemeClr val="accent6">
-                    <a:lumMod val="50000"/>
-                  </a:schemeClr>
-                </a:solidFill>
-              </a:rPr>
-              <a:t>when</a:t>
-            </a:r>
-            <a:r>
-              <a:rPr lang="nl-NL" sz="2600" b="1" dirty="0" smtClean="0">
-                <a:solidFill>
-                  <a:schemeClr val="accent6">
-                    <a:lumMod val="50000"/>
-                  </a:schemeClr>
-                </a:solidFill>
-              </a:rPr>
-              <a:t> </a:t>
-            </a:r>
-            <a:r>
-              <a:rPr lang="nl-NL" sz="2600" b="1" dirty="0" err="1" smtClean="0">
-                <a:solidFill>
-                  <a:schemeClr val="accent6">
-                    <a:lumMod val="50000"/>
-                  </a:schemeClr>
-                </a:solidFill>
-              </a:rPr>
-              <a:t>Observable</a:t>
-            </a:r>
-            <a:r>
-              <a:rPr lang="nl-NL" sz="2600" b="1" dirty="0" smtClean="0">
-                <a:solidFill>
-                  <a:schemeClr val="accent6">
-                    <a:lumMod val="50000"/>
-                  </a:schemeClr>
-                </a:solidFill>
-              </a:rPr>
-              <a:t> : </a:t>
-            </a:r>
-          </a:p>
-          <a:p>
-            <a:pPr marL="914400" lvl="2" indent="0">
-              <a:buNone/>
-            </a:pPr>
-            <a:r>
-              <a:rPr lang="nl-NL" sz="2600" b="1" dirty="0" smtClean="0">
-                <a:solidFill>
-                  <a:schemeClr val="accent6">
-                    <a:lumMod val="50000"/>
-                  </a:schemeClr>
-                </a:solidFill>
-              </a:rPr>
-              <a:t>// </a:t>
-            </a:r>
-            <a:r>
-              <a:rPr lang="nl-NL" sz="2600" b="1" dirty="0" err="1" smtClean="0">
-                <a:solidFill>
-                  <a:schemeClr val="accent6">
-                    <a:lumMod val="50000"/>
-                  </a:schemeClr>
-                </a:solidFill>
-              </a:rPr>
-              <a:t>this.appService.getBooks</a:t>
-            </a:r>
-            <a:r>
-              <a:rPr lang="nl-NL" sz="2600" b="1" dirty="0">
-                <a:solidFill>
-                  <a:schemeClr val="accent6">
-                    <a:lumMod val="50000"/>
-                  </a:schemeClr>
-                </a:solidFill>
-              </a:rPr>
-              <a:t>()</a:t>
-            </a:r>
-            <a:r>
-              <a:rPr lang="nl-NL" sz="3200" b="1" dirty="0">
-                <a:solidFill>
-                  <a:srgbClr val="C00000"/>
-                </a:solidFill>
-              </a:rPr>
-              <a:t>.</a:t>
-            </a:r>
-            <a:r>
-              <a:rPr lang="nl-NL" sz="3200" b="1" dirty="0" err="1">
-                <a:solidFill>
-                  <a:srgbClr val="C00000"/>
-                </a:solidFill>
-              </a:rPr>
-              <a:t>subscribe</a:t>
-            </a:r>
-            <a:r>
-              <a:rPr lang="nl-NL" sz="2600" b="1" dirty="0">
-                <a:solidFill>
-                  <a:schemeClr val="accent6">
-                    <a:lumMod val="50000"/>
-                  </a:schemeClr>
-                </a:solidFill>
-              </a:rPr>
-              <a:t>(</a:t>
-            </a:r>
-            <a:r>
-              <a:rPr lang="nl-NL" sz="2600" b="1" dirty="0" err="1">
-                <a:solidFill>
-                  <a:schemeClr val="accent6">
-                    <a:lumMod val="50000"/>
-                  </a:schemeClr>
-                </a:solidFill>
-              </a:rPr>
-              <a:t>bks</a:t>
-            </a:r>
-            <a:r>
-              <a:rPr lang="nl-NL" sz="2600" b="1" dirty="0">
-                <a:solidFill>
-                  <a:schemeClr val="accent6">
-                    <a:lumMod val="50000"/>
-                  </a:schemeClr>
-                </a:solidFill>
-              </a:rPr>
-              <a:t> =&gt; </a:t>
-            </a:r>
-            <a:r>
-              <a:rPr lang="nl-NL" sz="2600" b="1" dirty="0" err="1">
-                <a:solidFill>
-                  <a:schemeClr val="accent6">
-                    <a:lumMod val="50000"/>
-                  </a:schemeClr>
-                </a:solidFill>
-              </a:rPr>
-              <a:t>this.books</a:t>
-            </a:r>
-            <a:r>
-              <a:rPr lang="nl-NL" sz="2600" b="1" dirty="0">
-                <a:solidFill>
-                  <a:schemeClr val="accent6">
-                    <a:lumMod val="50000"/>
-                  </a:schemeClr>
-                </a:solidFill>
-              </a:rPr>
-              <a:t> = </a:t>
-            </a:r>
-            <a:r>
-              <a:rPr lang="nl-NL" sz="2600" b="1" dirty="0" err="1">
-                <a:solidFill>
-                  <a:schemeClr val="accent6">
-                    <a:lumMod val="50000"/>
-                  </a:schemeClr>
-                </a:solidFill>
-              </a:rPr>
-              <a:t>bks</a:t>
-            </a:r>
-            <a:r>
-              <a:rPr lang="nl-NL" sz="2600" b="1" dirty="0">
-                <a:solidFill>
-                  <a:schemeClr val="accent6">
-                    <a:lumMod val="50000"/>
-                  </a:schemeClr>
-                </a:solidFill>
-              </a:rPr>
-              <a:t>);</a:t>
-            </a:r>
-          </a:p>
-          <a:p>
-            <a:pPr marL="914400" lvl="2" indent="0">
-              <a:buNone/>
-            </a:pPr>
-            <a:endParaRPr lang="nl-NL" sz="2600" dirty="0" smtClean="0"/>
-          </a:p>
-          <a:p>
-            <a:pPr marL="914400" lvl="2" indent="0">
-              <a:buNone/>
-            </a:pPr>
-            <a:endParaRPr lang="nl-NL" sz="2600" dirty="0"/>
-          </a:p>
-          <a:p>
-            <a:pPr marL="914400" lvl="2" indent="0">
-              <a:buNone/>
-            </a:pPr>
-            <a:r>
-              <a:rPr lang="nl-NL" sz="2600" b="1" dirty="0" err="1" smtClean="0">
-                <a:solidFill>
-                  <a:srgbClr val="C00000"/>
-                </a:solidFill>
-              </a:rPr>
-              <a:t>ngOnInit</a:t>
-            </a:r>
-            <a:r>
-              <a:rPr lang="nl-NL" sz="2600" dirty="0"/>
-              <a:t>(){</a:t>
-            </a:r>
-          </a:p>
-          <a:p>
-            <a:pPr marL="914400" lvl="2" indent="0">
-              <a:buNone/>
-            </a:pPr>
-            <a:r>
-              <a:rPr lang="nl-NL" sz="2600" dirty="0"/>
-              <a:t>    </a:t>
-            </a:r>
-            <a:r>
-              <a:rPr lang="nl-NL" sz="2600" b="1" dirty="0" err="1" smtClean="0">
-                <a:solidFill>
-                  <a:schemeClr val="accent2"/>
-                </a:solidFill>
-              </a:rPr>
-              <a:t>this.getBooks</a:t>
-            </a:r>
-            <a:r>
-              <a:rPr lang="nl-NL" sz="2600" b="1" dirty="0" smtClean="0">
-                <a:solidFill>
-                  <a:schemeClr val="accent2"/>
-                </a:solidFill>
-              </a:rPr>
-              <a:t>();</a:t>
-            </a:r>
-            <a:endParaRPr lang="nl-NL" sz="2600" dirty="0"/>
-          </a:p>
-          <a:p>
-            <a:pPr marL="914400" lvl="2" indent="0">
-              <a:buNone/>
-            </a:pPr>
-            <a:r>
-              <a:rPr lang="nl-NL" sz="2600" dirty="0"/>
-              <a:t>  </a:t>
-            </a:r>
-            <a:r>
-              <a:rPr lang="nl-NL" sz="2600" dirty="0" smtClean="0"/>
-              <a:t>};</a:t>
-            </a:r>
-            <a:endParaRPr lang="nl-NL" sz="2600" dirty="0"/>
-          </a:p>
-          <a:p>
-            <a:pPr marL="0" indent="0">
-              <a:buNone/>
-            </a:pPr>
-            <a:r>
-              <a:rPr lang="nl-NL" dirty="0" smtClean="0"/>
-              <a:t>}</a:t>
-            </a:r>
-            <a:endParaRPr lang="nl-NL" dirty="0"/>
-          </a:p>
-        </p:txBody>
-      </p:sp>
-    </p:spTree>
-    <p:extLst>
-      <p:ext uri="{BB962C8B-B14F-4D97-AF65-F5344CB8AC3E}">
-        <p14:creationId xmlns:p14="http://schemas.microsoft.com/office/powerpoint/2010/main" val="1424609616"/>
-      </p:ext>
-    </p:extLst>
-  </p:cSld>
-  <p:clrMapOvr>
-    <a:masterClrMapping/>
-  </p:clrMapOvr>
-  <p:timing>
-    <p:tnLst>
-      <p:par>
-        <p:cTn id="1" dur="indefinite" restart="never" nodeType="tmRoot"/>
-      </p:par>
-    </p:tnLst>
-  </p:timing>
-</p:sld>
-</file>
-
-<file path=ppt/slides/slide29.xml><?xml version="1.0" encoding="utf-8"?>
-<p:sld xmlns:a="http://schemas.openxmlformats.org/drawingml/2006/main" xmlns:r="http://schemas.openxmlformats.org/officeDocument/2006/relationships" xmlns:p="http://schemas.openxmlformats.org/presentationml/2006/main">
-  <p:cSld>
-    <p:spTree>
-      <p:nvGrpSpPr>
-        <p:cNvPr id="1" name=""/>
-        <p:cNvGrpSpPr/>
-        <p:nvPr/>
-      </p:nvGrpSpPr>
-      <p:grpSpPr>
-        <a:xfrm>
-          <a:off x="0" y="0"/>
-          <a:ext cx="0" cy="0"/>
-          <a:chOff x="0" y="0"/>
-          <a:chExt cx="0" cy="0"/>
-        </a:xfrm>
-      </p:grpSpPr>
-      <p:sp>
-        <p:nvSpPr>
-          <p:cNvPr id="2" name="Titel 1"/>
-          <p:cNvSpPr>
-            <a:spLocks noGrp="1"/>
-          </p:cNvSpPr>
-          <p:nvPr>
-            <p:ph type="title"/>
-          </p:nvPr>
-        </p:nvSpPr>
-        <p:spPr/>
-        <p:txBody>
-          <a:bodyPr/>
-          <a:lstStyle/>
-          <a:p>
-            <a:pPr algn="ctr"/>
-            <a:r>
-              <a:rPr lang="nl-NL" b="1" dirty="0" err="1" smtClean="0">
-                <a:solidFill>
-                  <a:srgbClr val="FFC000"/>
-                </a:solidFill>
-              </a:rPr>
-              <a:t>Getting</a:t>
-            </a:r>
-            <a:r>
-              <a:rPr lang="nl-NL" b="1" dirty="0" smtClean="0">
-                <a:solidFill>
-                  <a:srgbClr val="FFC000"/>
-                </a:solidFill>
-              </a:rPr>
-              <a:t> </a:t>
-            </a:r>
-            <a:r>
-              <a:rPr lang="nl-NL" b="1" dirty="0" err="1" smtClean="0">
-                <a:solidFill>
-                  <a:srgbClr val="FFC000"/>
-                </a:solidFill>
-              </a:rPr>
-              <a:t>started</a:t>
-            </a:r>
-            <a:endParaRPr lang="nl-NL" b="1" dirty="0">
-              <a:solidFill>
-                <a:srgbClr val="FFC000"/>
-              </a:solidFill>
-            </a:endParaRPr>
-          </a:p>
-        </p:txBody>
-      </p:sp>
-      <p:sp>
-        <p:nvSpPr>
-          <p:cNvPr id="4" name="Rectangle 1"/>
-          <p:cNvSpPr>
-            <a:spLocks noGrp="1" noChangeArrowheads="1"/>
-          </p:cNvSpPr>
-          <p:nvPr>
-            <p:ph idx="1"/>
-          </p:nvPr>
-        </p:nvSpPr>
-        <p:spPr bwMode="auto">
-          <a:xfrm>
-            <a:off x="593124" y="1515864"/>
-            <a:ext cx="11232291" cy="4493538"/>
-          </a:xfrm>
-          <a:prstGeom prst="rect">
-            <a:avLst/>
-          </a:prstGeom>
-          <a:noFill/>
-          <a:ln>
-            <a:noFill/>
-          </a:ln>
-          <a:effectLst/>
-          <a:extLst>
-            <a:ext uri="{909E8E84-426E-40DD-AFC4-6F175D3DCCD1}">
-              <a14:hiddenFill xmlns:a14="http://schemas.microsoft.com/office/drawing/2010/main">
-                <a:solidFill>
-                  <a:schemeClr val="accent1"/>
-                </a:solidFill>
-              </a14:hiddenFill>
-            </a:ext>
-            <a:ext uri="{91240B29-F687-4F45-9708-019B960494DF}">
-              <a14:hiddenLine xmlns:a14="http://schemas.microsoft.com/office/drawing/2010/main" w="9525">
-                <a:solidFill>
-                  <a:schemeClr val="tx1"/>
-                </a:solidFill>
-                <a:miter lim="800000"/>
-                <a:headEnd/>
-                <a:tailEnd/>
-              </a14:hiddenLine>
-            </a:ext>
-            <a:ext uri="{AF507438-7753-43E0-B8FC-AC1667EBCBE1}">
-              <a14:hiddenEffects xmlns:a14="http://schemas.microsoft.com/office/drawing/2010/main">
-                <a:effectLst>
-                  <a:outerShdw dist="35921" dir="2700000" algn="ctr" rotWithShape="0">
-                    <a:schemeClr val="bg2"/>
-                  </a:outerShdw>
-                </a:effectLst>
-              </a14:hiddenEffects>
-            </a:ext>
-          </a:extLst>
-        </p:spPr>
-        <p:txBody>
-          <a:bodyPr vert="horz" wrap="square" lIns="0" tIns="0" rIns="0" bIns="0" numCol="1" anchor="ctr" anchorCtr="0" compatLnSpc="1">
-            <a:prstTxWarp prst="textNoShape">
-              <a:avLst/>
-            </a:prstTxWarp>
-            <a:spAutoFit/>
-          </a:bodyPr>
-          <a:lstStyle>
-            <a:lvl1pPr eaLnBrk="0" fontAlgn="base" hangingPunct="0">
-              <a:spcBef>
-                <a:spcPct val="0"/>
-              </a:spcBef>
-              <a:spcAft>
-                <a:spcPct val="0"/>
-              </a:spcAft>
-              <a:defRPr>
-                <a:solidFill>
-                  <a:schemeClr val="tx1"/>
-                </a:solidFill>
-                <a:latin typeface="Arial" panose="020B0604020202020204" pitchFamily="34" charset="0"/>
-              </a:defRPr>
-            </a:lvl1pPr>
-            <a:lvl2pPr eaLnBrk="0" fontAlgn="base" hangingPunct="0">
-              <a:spcBef>
-                <a:spcPct val="0"/>
-              </a:spcBef>
-              <a:spcAft>
-                <a:spcPct val="0"/>
-              </a:spcAft>
-              <a:defRPr>
-                <a:solidFill>
-                  <a:schemeClr val="tx1"/>
-                </a:solidFill>
-                <a:latin typeface="Arial" panose="020B0604020202020204" pitchFamily="34" charset="0"/>
-              </a:defRPr>
-            </a:lvl2pPr>
-            <a:lvl3pPr eaLnBrk="0" fontAlgn="base" hangingPunct="0">
-              <a:spcBef>
-                <a:spcPct val="0"/>
-              </a:spcBef>
-              <a:spcAft>
-                <a:spcPct val="0"/>
-              </a:spcAft>
-              <a:defRPr>
-                <a:solidFill>
-                  <a:schemeClr val="tx1"/>
-                </a:solidFill>
-                <a:latin typeface="Arial" panose="020B0604020202020204" pitchFamily="34" charset="0"/>
-              </a:defRPr>
-            </a:lvl3pPr>
-            <a:lvl4pPr eaLnBrk="0" fontAlgn="base" hangingPunct="0">
-              <a:spcBef>
-                <a:spcPct val="0"/>
-              </a:spcBef>
-              <a:spcAft>
-                <a:spcPct val="0"/>
-              </a:spcAft>
-              <a:defRPr>
-                <a:solidFill>
-                  <a:schemeClr val="tx1"/>
-                </a:solidFill>
-                <a:latin typeface="Arial" panose="020B0604020202020204" pitchFamily="34" charset="0"/>
-              </a:defRPr>
-            </a:lvl4pPr>
-            <a:lvl5pPr eaLnBrk="0" fontAlgn="base" hangingPunct="0">
-              <a:spcBef>
-                <a:spcPct val="0"/>
-              </a:spcBef>
-              <a:spcAft>
-                <a:spcPct val="0"/>
-              </a:spcAft>
-              <a:defRPr>
-                <a:solidFill>
-                  <a:schemeClr val="tx1"/>
-                </a:solidFill>
-                <a:latin typeface="Arial" panose="020B0604020202020204" pitchFamily="34" charset="0"/>
-              </a:defRPr>
-            </a:lvl5pPr>
-            <a:lvl6pPr eaLnBrk="0" fontAlgn="base" hangingPunct="0">
-              <a:spcBef>
-                <a:spcPct val="0"/>
-              </a:spcBef>
-              <a:spcAft>
-                <a:spcPct val="0"/>
-              </a:spcAft>
-              <a:defRPr>
-                <a:solidFill>
-                  <a:schemeClr val="tx1"/>
-                </a:solidFill>
-                <a:latin typeface="Arial" panose="020B0604020202020204" pitchFamily="34" charset="0"/>
-              </a:defRPr>
-            </a:lvl6pPr>
-            <a:lvl7pPr eaLnBrk="0" fontAlgn="base" hangingPunct="0">
-              <a:spcBef>
-                <a:spcPct val="0"/>
-              </a:spcBef>
-              <a:spcAft>
-                <a:spcPct val="0"/>
-              </a:spcAft>
-              <a:defRPr>
-                <a:solidFill>
-                  <a:schemeClr val="tx1"/>
-                </a:solidFill>
-                <a:latin typeface="Arial" panose="020B0604020202020204" pitchFamily="34" charset="0"/>
-              </a:defRPr>
-            </a:lvl7pPr>
-            <a:lvl8pPr eaLnBrk="0" fontAlgn="base" hangingPunct="0">
-              <a:spcBef>
-                <a:spcPct val="0"/>
-              </a:spcBef>
-              <a:spcAft>
-                <a:spcPct val="0"/>
-              </a:spcAft>
-              <a:defRPr>
-                <a:solidFill>
-                  <a:schemeClr val="tx1"/>
-                </a:solidFill>
-                <a:latin typeface="Arial" panose="020B0604020202020204" pitchFamily="34" charset="0"/>
-              </a:defRPr>
-            </a:lvl8pPr>
-            <a:lvl9pPr eaLnBrk="0" fontAlgn="base" hangingPunct="0">
-              <a:spcBef>
-                <a:spcPct val="0"/>
-              </a:spcBef>
-              <a:spcAft>
-                <a:spcPct val="0"/>
-              </a:spcAft>
-              <a:defRPr>
-                <a:solidFill>
-                  <a:schemeClr val="tx1"/>
-                </a:solidFill>
-                <a:latin typeface="Arial" panose="020B0604020202020204" pitchFamily="34" charset="0"/>
-              </a:defRPr>
-            </a:lvl9pPr>
-          </a:lstStyle>
-          <a:p>
-            <a:pPr marL="0" lvl="0" indent="0">
-              <a:lnSpc>
-                <a:spcPct val="100000"/>
-              </a:lnSpc>
-              <a:buNone/>
-            </a:pPr>
-            <a:r>
-              <a:rPr lang="en-US" altLang="nl-NL" sz="2400" dirty="0" smtClean="0">
-                <a:latin typeface="+mn-lt"/>
-              </a:rPr>
-              <a:t>Download:  </a:t>
-            </a:r>
-            <a:r>
-              <a:rPr lang="en-US" altLang="nl-NL" b="1" dirty="0" smtClean="0">
-                <a:solidFill>
-                  <a:srgbClr val="FF0000"/>
-                </a:solidFill>
-                <a:latin typeface="+mn-lt"/>
-              </a:rPr>
-              <a:t>https</a:t>
-            </a:r>
-            <a:r>
-              <a:rPr lang="en-US" altLang="nl-NL" b="1" dirty="0">
-                <a:solidFill>
-                  <a:srgbClr val="FF0000"/>
-                </a:solidFill>
-                <a:latin typeface="+mn-lt"/>
-              </a:rPr>
-              <a:t>://</a:t>
-            </a:r>
-            <a:r>
-              <a:rPr lang="en-US" altLang="nl-NL" b="1" dirty="0" err="1">
-                <a:solidFill>
-                  <a:srgbClr val="FF0000"/>
-                </a:solidFill>
-                <a:latin typeface="+mn-lt"/>
-              </a:rPr>
-              <a:t>github.com</a:t>
-            </a:r>
-            <a:r>
-              <a:rPr lang="en-US" altLang="nl-NL" b="1" dirty="0">
-                <a:solidFill>
-                  <a:srgbClr val="FF0000"/>
-                </a:solidFill>
-                <a:latin typeface="+mn-lt"/>
-              </a:rPr>
-              <a:t>/petereijgermans11/workshop-</a:t>
-            </a:r>
-            <a:r>
-              <a:rPr lang="en-US" altLang="nl-NL" b="1" dirty="0" err="1">
-                <a:solidFill>
-                  <a:srgbClr val="FF0000"/>
-                </a:solidFill>
-                <a:latin typeface="+mn-lt"/>
-              </a:rPr>
-              <a:t>reactjs</a:t>
-            </a:r>
-            <a:r>
-              <a:rPr lang="en-US" altLang="nl-NL" b="1" dirty="0">
-                <a:solidFill>
-                  <a:srgbClr val="FF0000"/>
-                </a:solidFill>
-                <a:latin typeface="+mn-lt"/>
-              </a:rPr>
-              <a:t>-angular</a:t>
-            </a:r>
-            <a:endParaRPr lang="en-US" altLang="nl-NL" b="1" dirty="0" smtClean="0">
-              <a:solidFill>
-                <a:srgbClr val="FF0000"/>
-              </a:solidFill>
-              <a:latin typeface="+mn-lt"/>
-            </a:endParaRPr>
-          </a:p>
-          <a:p>
-            <a:pPr marL="0" lvl="0" indent="0">
-              <a:lnSpc>
-                <a:spcPct val="100000"/>
-              </a:lnSpc>
-              <a:buNone/>
-            </a:pPr>
-            <a:endParaRPr lang="en-US" altLang="nl-NL" sz="2400" b="1" dirty="0" smtClean="0">
-              <a:latin typeface="+mn-lt"/>
-            </a:endParaRPr>
-          </a:p>
-          <a:p>
-            <a:pPr marL="0" lvl="0" indent="0">
-              <a:lnSpc>
-                <a:spcPct val="100000"/>
-              </a:lnSpc>
-              <a:buNone/>
-            </a:pPr>
-            <a:r>
-              <a:rPr lang="en-US" altLang="nl-NL" sz="2400" dirty="0" smtClean="0">
-                <a:latin typeface="+mn-lt"/>
-              </a:rPr>
-              <a:t>    </a:t>
-            </a:r>
-            <a:endParaRPr lang="en-US" altLang="nl-NL" sz="2400" dirty="0">
-              <a:latin typeface="+mn-lt"/>
-            </a:endParaRPr>
-          </a:p>
-          <a:p>
-            <a:pPr marL="0" lvl="0" indent="0">
-              <a:lnSpc>
-                <a:spcPct val="100000"/>
-              </a:lnSpc>
-              <a:buNone/>
-            </a:pPr>
-            <a:r>
-              <a:rPr lang="en-US" altLang="nl-NL" sz="2400" dirty="0">
-                <a:latin typeface="+mn-lt"/>
-              </a:rPr>
-              <a:t>Bootstrap your application: </a:t>
-            </a:r>
-            <a:r>
-              <a:rPr lang="en-US" altLang="nl-NL" sz="2400" dirty="0" smtClean="0">
-                <a:latin typeface="+mn-lt"/>
-              </a:rPr>
-              <a:t> </a:t>
-            </a:r>
-            <a:r>
-              <a:rPr lang="en-US" sz="2400" b="1" dirty="0"/>
-              <a:t>cd ./angular </a:t>
-            </a:r>
-            <a:endParaRPr lang="en-US" sz="2400" b="1" dirty="0" smtClean="0"/>
-          </a:p>
-          <a:p>
-            <a:pPr marL="0" lvl="0" indent="0">
-              <a:lnSpc>
-                <a:spcPct val="100000"/>
-              </a:lnSpc>
-              <a:buNone/>
-            </a:pPr>
-            <a:r>
-              <a:rPr lang="en-US" sz="2400" dirty="0"/>
-              <a:t> </a:t>
-            </a:r>
-            <a:r>
-              <a:rPr lang="en-US" sz="2400" dirty="0" smtClean="0"/>
-              <a:t>                                         </a:t>
-            </a:r>
-            <a:r>
-              <a:rPr lang="en-US" sz="2400" b="1" dirty="0" smtClean="0"/>
-              <a:t>yarn </a:t>
-            </a:r>
-            <a:r>
-              <a:rPr lang="en-US" sz="2400" b="1" dirty="0"/>
-              <a:t>start</a:t>
-            </a:r>
-            <a:endParaRPr lang="en-US" altLang="nl-NL" sz="2400" b="1" dirty="0" smtClean="0">
-              <a:latin typeface="+mn-lt"/>
-            </a:endParaRPr>
-          </a:p>
-          <a:p>
-            <a:pPr marL="0" lvl="0" indent="0">
-              <a:lnSpc>
-                <a:spcPct val="100000"/>
-              </a:lnSpc>
-              <a:buNone/>
-            </a:pPr>
-            <a:endParaRPr lang="en-US" altLang="nl-NL" sz="2400" dirty="0" smtClean="0">
-              <a:latin typeface="+mn-lt"/>
-            </a:endParaRPr>
-          </a:p>
-          <a:p>
-            <a:pPr marL="0" lvl="0" indent="0">
-              <a:lnSpc>
-                <a:spcPct val="100000"/>
-              </a:lnSpc>
-              <a:buNone/>
-            </a:pPr>
-            <a:endParaRPr lang="en-US" altLang="nl-NL" sz="2400" dirty="0">
-              <a:latin typeface="+mn-lt"/>
-            </a:endParaRPr>
-          </a:p>
-          <a:p>
-            <a:pPr marL="0" lvl="0" indent="0">
-              <a:lnSpc>
-                <a:spcPct val="100000"/>
-              </a:lnSpc>
-              <a:buNone/>
-            </a:pPr>
-            <a:r>
-              <a:rPr lang="en-US" altLang="nl-NL" sz="2400" dirty="0">
-                <a:latin typeface="+mn-lt"/>
-              </a:rPr>
-              <a:t>!oops</a:t>
-            </a:r>
-          </a:p>
-          <a:p>
-            <a:pPr marL="0" lvl="0" indent="0">
-              <a:lnSpc>
-                <a:spcPct val="100000"/>
-              </a:lnSpc>
-              <a:buNone/>
-            </a:pPr>
-            <a:endParaRPr lang="en-US" altLang="nl-NL" sz="2400" dirty="0">
-              <a:latin typeface="+mn-lt"/>
-            </a:endParaRPr>
-          </a:p>
-          <a:p>
-            <a:pPr marL="0" lvl="0" indent="0">
-              <a:lnSpc>
-                <a:spcPct val="100000"/>
-              </a:lnSpc>
-              <a:buNone/>
-            </a:pPr>
-            <a:r>
-              <a:rPr lang="en-US" altLang="nl-NL" sz="2400" dirty="0">
-                <a:latin typeface="+mn-lt"/>
-              </a:rPr>
-              <a:t>This application doesn't work </a:t>
-            </a:r>
-            <a:r>
-              <a:rPr lang="en-US" altLang="nl-NL" sz="2400" dirty="0" smtClean="0">
-                <a:latin typeface="+mn-lt"/>
-              </a:rPr>
-              <a:t>:(</a:t>
-            </a:r>
-          </a:p>
-          <a:p>
-            <a:pPr marL="0" lvl="0" indent="0">
-              <a:lnSpc>
-                <a:spcPct val="100000"/>
-              </a:lnSpc>
-              <a:buNone/>
-            </a:pPr>
-            <a:endParaRPr kumimoji="0" lang="en-US" altLang="nl-NL" sz="2400" b="0" i="0" u="none" strike="noStrike" cap="none" normalizeH="0" baseline="0" dirty="0">
-              <a:ln>
-                <a:noFill/>
-              </a:ln>
-              <a:solidFill>
-                <a:schemeClr val="tx1"/>
-              </a:solidFill>
-              <a:effectLst/>
-              <a:latin typeface="+mn-lt"/>
-            </a:endParaRPr>
-          </a:p>
-          <a:p>
-            <a:pPr marL="0" lvl="0" indent="0">
-              <a:lnSpc>
-                <a:spcPct val="100000"/>
-              </a:lnSpc>
-              <a:buNone/>
-            </a:pPr>
-            <a:r>
-              <a:rPr lang="en-US" altLang="nl-NL" sz="2400" b="1" dirty="0">
-                <a:latin typeface="+mn-lt"/>
-              </a:rPr>
-              <a:t>See </a:t>
-            </a:r>
-            <a:r>
-              <a:rPr lang="en-US" altLang="nl-NL" sz="2400" b="1" dirty="0" smtClean="0">
-                <a:latin typeface="+mn-lt"/>
-              </a:rPr>
-              <a:t>tutorial to fix the problems:  </a:t>
-            </a:r>
-            <a:r>
-              <a:rPr lang="en-US" altLang="nl-NL" sz="2400" b="1" dirty="0">
-                <a:solidFill>
-                  <a:srgbClr val="FF0000"/>
-                </a:solidFill>
-                <a:latin typeface="+mn-lt"/>
-              </a:rPr>
-              <a:t>https://</a:t>
-            </a:r>
-            <a:r>
-              <a:rPr lang="en-US" altLang="nl-NL" sz="2400" b="1" dirty="0" err="1">
-                <a:solidFill>
-                  <a:srgbClr val="FF0000"/>
-                </a:solidFill>
-                <a:latin typeface="+mn-lt"/>
-              </a:rPr>
-              <a:t>angular.io</a:t>
-            </a:r>
-            <a:r>
-              <a:rPr lang="en-US" altLang="nl-NL" sz="2400" b="1" dirty="0">
-                <a:solidFill>
-                  <a:srgbClr val="FF0000"/>
-                </a:solidFill>
-                <a:latin typeface="+mn-lt"/>
-              </a:rPr>
-              <a:t>/tutorial/toh-pt6</a:t>
-            </a:r>
-            <a:endParaRPr kumimoji="0" lang="nl-NL" altLang="nl-NL" sz="2400" b="1" i="0" u="none" strike="noStrike" cap="none" normalizeH="0" baseline="0" dirty="0" smtClean="0">
-              <a:ln>
-                <a:noFill/>
-              </a:ln>
-              <a:solidFill>
-                <a:srgbClr val="FF0000"/>
-              </a:solidFill>
-              <a:effectLst/>
-              <a:latin typeface="+mn-lt"/>
-            </a:endParaRPr>
-          </a:p>
-        </p:txBody>
-      </p:sp>
-    </p:spTree>
-    <p:extLst>
-      <p:ext uri="{BB962C8B-B14F-4D97-AF65-F5344CB8AC3E}">
-        <p14:creationId xmlns:p14="http://schemas.microsoft.com/office/powerpoint/2010/main" val="656802931"/>
-      </p:ext>
-    </p:extLst>
-  </p:cSld>
-  <p:clrMapOvr>
-    <a:masterClrMapping/>
-  </p:clrMapOvr>
-  <p:timing>
-    <p:tnLst>
-      <p:par>
-        <p:cTn id="1" dur="indefinite" restart="never" nodeType="tmRoot"/>
-      </p:par>
-    </p:tnLst>
-  </p:timing>
-</p:sld>
-</file>
-
 <file path=ppt/slides/slide3.xml><?xml version="1.0" encoding="utf-8"?>
 <p:sld xmlns:a="http://schemas.openxmlformats.org/drawingml/2006/main" xmlns:r="http://schemas.openxmlformats.org/officeDocument/2006/relationships" xmlns:p="http://schemas.openxmlformats.org/presentationml/2006/main">
   <p:cSld>
@@ -21989,6 +21212,1334 @@
     <p:extLst>
       <p:ext uri="{BB962C8B-B14F-4D97-AF65-F5344CB8AC3E}">
         <p14:creationId xmlns:p14="http://schemas.microsoft.com/office/powerpoint/2010/main" val="3722296180"/>
+      </p:ext>
+    </p:extLst>
+  </p:cSld>
+  <p:clrMapOvr>
+    <a:masterClrMapping/>
+  </p:clrMapOvr>
+  <p:timing>
+    <p:tnLst>
+      <p:par>
+        <p:cTn id="1" dur="indefinite" restart="never" nodeType="tmRoot"/>
+      </p:par>
+    </p:tnLst>
+  </p:timing>
+</p:sld>
+</file>
+
+<file path=ppt/slides/slide30.xml><?xml version="1.0" encoding="utf-8"?>
+<p:sld xmlns:a="http://schemas.openxmlformats.org/drawingml/2006/main" xmlns:r="http://schemas.openxmlformats.org/officeDocument/2006/relationships" xmlns:p="http://schemas.openxmlformats.org/presentationml/2006/main">
+  <p:cSld>
+    <p:spTree>
+      <p:nvGrpSpPr>
+        <p:cNvPr id="1" name=""/>
+        <p:cNvGrpSpPr/>
+        <p:nvPr/>
+      </p:nvGrpSpPr>
+      <p:grpSpPr>
+        <a:xfrm>
+          <a:off x="0" y="0"/>
+          <a:ext cx="0" cy="0"/>
+          <a:chOff x="0" y="0"/>
+          <a:chExt cx="0" cy="0"/>
+        </a:xfrm>
+      </p:grpSpPr>
+      <p:sp>
+        <p:nvSpPr>
+          <p:cNvPr id="2" name="Title 1"/>
+          <p:cNvSpPr>
+            <a:spLocks noGrp="1"/>
+          </p:cNvSpPr>
+          <p:nvPr>
+            <p:ph type="title"/>
+          </p:nvPr>
+        </p:nvSpPr>
+        <p:spPr/>
+        <p:txBody>
+          <a:bodyPr/>
+          <a:lstStyle/>
+          <a:p>
+            <a:pPr algn="ctr"/>
+            <a:r>
+              <a:rPr lang="nl-NL" b="1" dirty="0" err="1" smtClean="0">
+                <a:solidFill>
+                  <a:srgbClr val="FFC000"/>
+                </a:solidFill>
+              </a:rPr>
+              <a:t>Inject</a:t>
+            </a:r>
+            <a:r>
+              <a:rPr lang="nl-NL" b="1" dirty="0" smtClean="0">
+                <a:solidFill>
+                  <a:srgbClr val="FFC000"/>
+                </a:solidFill>
+              </a:rPr>
+              <a:t> service via the </a:t>
+            </a:r>
+            <a:r>
+              <a:rPr lang="nl-NL" b="1" dirty="0" err="1" smtClean="0">
+                <a:solidFill>
+                  <a:srgbClr val="FFC000"/>
+                </a:solidFill>
+              </a:rPr>
+              <a:t>constructor</a:t>
+            </a:r>
+            <a:endParaRPr lang="nl-NL" b="1" dirty="0">
+              <a:solidFill>
+                <a:srgbClr val="FFC000"/>
+              </a:solidFill>
+            </a:endParaRPr>
+          </a:p>
+        </p:txBody>
+      </p:sp>
+      <p:sp>
+        <p:nvSpPr>
+          <p:cNvPr id="3" name="Content Placeholder 2"/>
+          <p:cNvSpPr>
+            <a:spLocks noGrp="1"/>
+          </p:cNvSpPr>
+          <p:nvPr>
+            <p:ph idx="1"/>
+          </p:nvPr>
+        </p:nvSpPr>
+        <p:spPr>
+          <a:xfrm>
+            <a:off x="3002692" y="1690688"/>
+            <a:ext cx="8452022" cy="5031387"/>
+          </a:xfrm>
+        </p:spPr>
+        <p:txBody>
+          <a:bodyPr>
+            <a:normAutofit fontScale="55000" lnSpcReduction="20000"/>
+          </a:bodyPr>
+          <a:lstStyle/>
+          <a:p>
+            <a:pPr marL="0" indent="0">
+              <a:buNone/>
+            </a:pPr>
+            <a:r>
+              <a:rPr lang="nl-NL" dirty="0" smtClean="0"/>
+              <a:t>export </a:t>
+            </a:r>
+            <a:r>
+              <a:rPr lang="nl-NL" dirty="0"/>
+              <a:t>class </a:t>
+            </a:r>
+            <a:r>
+              <a:rPr lang="nl-NL" dirty="0" err="1"/>
+              <a:t>BooksComponent</a:t>
+            </a:r>
+            <a:r>
+              <a:rPr lang="nl-NL" dirty="0"/>
+              <a:t> {</a:t>
+            </a:r>
+          </a:p>
+          <a:p>
+            <a:pPr marL="0" indent="0">
+              <a:buNone/>
+            </a:pPr>
+            <a:r>
+              <a:rPr lang="nl-NL" dirty="0" smtClean="0"/>
+              <a:t>	</a:t>
+            </a:r>
+            <a:r>
+              <a:rPr lang="nl-NL" dirty="0" err="1" smtClean="0"/>
+              <a:t>books</a:t>
+            </a:r>
+            <a:r>
+              <a:rPr lang="nl-NL" dirty="0"/>
+              <a:t>: </a:t>
+            </a:r>
+            <a:r>
+              <a:rPr lang="nl-NL" dirty="0" err="1"/>
+              <a:t>Book</a:t>
+            </a:r>
+            <a:r>
+              <a:rPr lang="nl-NL" dirty="0"/>
+              <a:t>[] = </a:t>
+            </a:r>
+            <a:r>
+              <a:rPr lang="nl-NL" dirty="0" smtClean="0"/>
+              <a:t>[];</a:t>
+            </a:r>
+          </a:p>
+          <a:p>
+            <a:pPr marL="0" indent="0">
+              <a:buNone/>
+            </a:pPr>
+            <a:r>
+              <a:rPr lang="nl-NL" dirty="0"/>
+              <a:t> </a:t>
+            </a:r>
+            <a:r>
+              <a:rPr lang="nl-NL" dirty="0" smtClean="0"/>
+              <a:t>                 </a:t>
+            </a:r>
+            <a:r>
+              <a:rPr lang="nl-NL" b="1" dirty="0" smtClean="0">
+                <a:solidFill>
+                  <a:schemeClr val="accent6">
+                    <a:lumMod val="50000"/>
+                  </a:schemeClr>
+                </a:solidFill>
+              </a:rPr>
+              <a:t>// </a:t>
+            </a:r>
+            <a:r>
+              <a:rPr lang="nl-NL" b="1" dirty="0" err="1" smtClean="0">
+                <a:solidFill>
+                  <a:schemeClr val="accent6">
+                    <a:lumMod val="50000"/>
+                  </a:schemeClr>
+                </a:solidFill>
+              </a:rPr>
+              <a:t>books</a:t>
+            </a:r>
+            <a:r>
+              <a:rPr lang="nl-NL" b="1" dirty="0">
+                <a:solidFill>
+                  <a:schemeClr val="accent6">
+                    <a:lumMod val="50000"/>
+                  </a:schemeClr>
+                </a:solidFill>
+              </a:rPr>
+              <a:t>: </a:t>
+            </a:r>
+            <a:r>
+              <a:rPr lang="nl-NL" b="1" dirty="0" err="1">
+                <a:solidFill>
+                  <a:schemeClr val="accent6">
+                    <a:lumMod val="50000"/>
+                  </a:schemeClr>
+                </a:solidFill>
+              </a:rPr>
+              <a:t>Observable</a:t>
+            </a:r>
+            <a:r>
+              <a:rPr lang="nl-NL" b="1" dirty="0">
+                <a:solidFill>
+                  <a:schemeClr val="accent6">
+                    <a:lumMod val="50000"/>
+                  </a:schemeClr>
+                </a:solidFill>
+              </a:rPr>
+              <a:t>&lt;</a:t>
+            </a:r>
+            <a:r>
+              <a:rPr lang="nl-NL" b="1" dirty="0" err="1">
+                <a:solidFill>
+                  <a:schemeClr val="accent6">
+                    <a:lumMod val="50000"/>
+                  </a:schemeClr>
+                </a:solidFill>
+              </a:rPr>
+              <a:t>Book</a:t>
+            </a:r>
+            <a:r>
+              <a:rPr lang="nl-NL" b="1" dirty="0" smtClean="0">
+                <a:solidFill>
+                  <a:schemeClr val="accent6">
+                    <a:lumMod val="50000"/>
+                  </a:schemeClr>
+                </a:solidFill>
+              </a:rPr>
+              <a:t>[]&gt;;</a:t>
+            </a:r>
+            <a:endParaRPr lang="nl-NL" b="1" dirty="0">
+              <a:solidFill>
+                <a:schemeClr val="accent6">
+                  <a:lumMod val="50000"/>
+                </a:schemeClr>
+              </a:solidFill>
+            </a:endParaRPr>
+          </a:p>
+          <a:p>
+            <a:pPr marL="0" indent="0">
+              <a:buNone/>
+            </a:pPr>
+            <a:endParaRPr lang="nl-NL" dirty="0" smtClean="0"/>
+          </a:p>
+          <a:p>
+            <a:pPr marL="0" indent="0">
+              <a:buNone/>
+            </a:pPr>
+            <a:r>
+              <a:rPr lang="nl-NL" dirty="0" smtClean="0"/>
+              <a:t>	</a:t>
+            </a:r>
+            <a:r>
+              <a:rPr lang="nl-NL" dirty="0" err="1" smtClean="0"/>
+              <a:t>constructor</a:t>
+            </a:r>
+            <a:r>
+              <a:rPr lang="nl-NL" dirty="0" smtClean="0"/>
+              <a:t>(</a:t>
+            </a:r>
+            <a:r>
+              <a:rPr lang="nl-NL" b="1" dirty="0" smtClean="0">
+                <a:solidFill>
+                  <a:srgbClr val="C00000"/>
+                </a:solidFill>
+              </a:rPr>
+              <a:t>private </a:t>
+            </a:r>
+            <a:r>
+              <a:rPr lang="nl-NL" b="1" dirty="0" err="1">
+                <a:solidFill>
+                  <a:srgbClr val="C00000"/>
+                </a:solidFill>
+              </a:rPr>
+              <a:t>appService</a:t>
+            </a:r>
+            <a:r>
+              <a:rPr lang="nl-NL" b="1" dirty="0">
+                <a:solidFill>
+                  <a:srgbClr val="C00000"/>
+                </a:solidFill>
+              </a:rPr>
+              <a:t>: </a:t>
+            </a:r>
+            <a:r>
+              <a:rPr lang="nl-NL" b="1" dirty="0" err="1">
+                <a:solidFill>
+                  <a:srgbClr val="C00000"/>
+                </a:solidFill>
+              </a:rPr>
+              <a:t>AppService</a:t>
+            </a:r>
+            <a:r>
+              <a:rPr lang="nl-NL" dirty="0" smtClean="0"/>
+              <a:t>) {  }</a:t>
+            </a:r>
+          </a:p>
+          <a:p>
+            <a:pPr marL="0" indent="0">
+              <a:buNone/>
+            </a:pPr>
+            <a:endParaRPr lang="nl-NL" dirty="0" smtClean="0"/>
+          </a:p>
+          <a:p>
+            <a:pPr marL="0" indent="0">
+              <a:buNone/>
+            </a:pPr>
+            <a:r>
+              <a:rPr lang="nl-NL" dirty="0"/>
+              <a:t> </a:t>
+            </a:r>
+            <a:r>
+              <a:rPr lang="nl-NL" dirty="0" smtClean="0"/>
+              <a:t>                     // </a:t>
+            </a:r>
+            <a:r>
+              <a:rPr lang="nl-NL" dirty="0" err="1" smtClean="0"/>
+              <a:t>Promise</a:t>
+            </a:r>
+            <a:r>
+              <a:rPr lang="nl-NL" dirty="0" smtClean="0"/>
+              <a:t> solution</a:t>
+            </a:r>
+            <a:endParaRPr lang="nl-NL" dirty="0"/>
+          </a:p>
+          <a:p>
+            <a:pPr marL="914400" lvl="2" indent="0">
+              <a:buNone/>
+            </a:pPr>
+            <a:r>
+              <a:rPr lang="nl-NL" sz="2600" b="1" dirty="0" err="1" smtClean="0">
+                <a:solidFill>
+                  <a:srgbClr val="C00000"/>
+                </a:solidFill>
+              </a:rPr>
+              <a:t>getBooks</a:t>
+            </a:r>
+            <a:r>
+              <a:rPr lang="nl-NL" sz="2600" dirty="0" smtClean="0"/>
+              <a:t>(): </a:t>
+            </a:r>
+            <a:r>
+              <a:rPr lang="nl-NL" sz="2600" dirty="0" err="1" smtClean="0"/>
+              <a:t>void</a:t>
+            </a:r>
+            <a:r>
+              <a:rPr lang="nl-NL" sz="2600" dirty="0" smtClean="0"/>
+              <a:t> {</a:t>
+            </a:r>
+            <a:endParaRPr lang="nl-NL" sz="2600" dirty="0"/>
+          </a:p>
+          <a:p>
+            <a:pPr marL="914400" lvl="2" indent="0">
+              <a:buNone/>
+            </a:pPr>
+            <a:r>
+              <a:rPr lang="nl-NL" sz="2600" dirty="0"/>
+              <a:t>    </a:t>
+            </a:r>
+            <a:r>
+              <a:rPr lang="nl-NL" sz="2600" dirty="0" smtClean="0"/>
+              <a:t> </a:t>
+            </a:r>
+            <a:r>
+              <a:rPr lang="nl-NL" sz="2600" b="1" dirty="0" err="1" smtClean="0">
+                <a:solidFill>
+                  <a:schemeClr val="accent2"/>
+                </a:solidFill>
+              </a:rPr>
+              <a:t>this.appService</a:t>
+            </a:r>
+            <a:r>
+              <a:rPr lang="nl-NL" sz="2600" dirty="0" err="1" smtClean="0"/>
+              <a:t>.getBooks</a:t>
+            </a:r>
+            <a:r>
+              <a:rPr lang="nl-NL" sz="2600" dirty="0"/>
+              <a:t>()</a:t>
+            </a:r>
+            <a:r>
+              <a:rPr lang="nl-NL" sz="2600" b="1" dirty="0">
+                <a:solidFill>
+                  <a:srgbClr val="C00000"/>
+                </a:solidFill>
+              </a:rPr>
+              <a:t>.</a:t>
+            </a:r>
+            <a:r>
+              <a:rPr lang="nl-NL" sz="2600" b="1" dirty="0" err="1" smtClean="0">
+                <a:solidFill>
+                  <a:srgbClr val="C00000"/>
+                </a:solidFill>
+              </a:rPr>
+              <a:t>then</a:t>
+            </a:r>
+            <a:r>
+              <a:rPr lang="nl-NL" sz="2600" dirty="0" smtClean="0"/>
+              <a:t>(</a:t>
+            </a:r>
+            <a:r>
+              <a:rPr lang="nl-NL" sz="2600" dirty="0" err="1" smtClean="0"/>
+              <a:t>books</a:t>
+            </a:r>
+            <a:r>
+              <a:rPr lang="nl-NL" sz="2600" dirty="0" smtClean="0"/>
+              <a:t> </a:t>
+            </a:r>
+            <a:r>
+              <a:rPr lang="nl-NL" sz="2600" dirty="0"/>
+              <a:t>=&gt; {</a:t>
+            </a:r>
+          </a:p>
+          <a:p>
+            <a:pPr marL="914400" lvl="2" indent="0">
+              <a:buNone/>
+            </a:pPr>
+            <a:r>
+              <a:rPr lang="nl-NL" sz="2600" dirty="0"/>
+              <a:t>      </a:t>
+            </a:r>
+            <a:r>
+              <a:rPr lang="nl-NL" sz="2600" dirty="0" err="1"/>
+              <a:t>this.books</a:t>
+            </a:r>
+            <a:r>
+              <a:rPr lang="nl-NL" sz="2600" dirty="0"/>
+              <a:t> = </a:t>
+            </a:r>
+            <a:r>
+              <a:rPr lang="nl-NL" sz="2600" dirty="0" err="1"/>
+              <a:t>books</a:t>
+            </a:r>
+            <a:r>
+              <a:rPr lang="nl-NL" sz="2600" dirty="0" smtClean="0"/>
+              <a:t>;</a:t>
+            </a:r>
+            <a:endParaRPr lang="nl-NL" sz="2600" dirty="0"/>
+          </a:p>
+          <a:p>
+            <a:pPr marL="914400" lvl="2" indent="0">
+              <a:buNone/>
+            </a:pPr>
+            <a:r>
+              <a:rPr lang="nl-NL" sz="2600" dirty="0"/>
+              <a:t>    </a:t>
+            </a:r>
+            <a:r>
+              <a:rPr lang="nl-NL" sz="2600" dirty="0" smtClean="0"/>
+              <a:t>});</a:t>
+            </a:r>
+          </a:p>
+          <a:p>
+            <a:pPr marL="914400" lvl="2" indent="0">
+              <a:buNone/>
+            </a:pPr>
+            <a:endParaRPr lang="nl-NL" sz="2600" dirty="0"/>
+          </a:p>
+          <a:p>
+            <a:pPr marL="914400" lvl="2" indent="0">
+              <a:buNone/>
+            </a:pPr>
+            <a:r>
+              <a:rPr lang="nl-NL" sz="2600" b="1" dirty="0" smtClean="0">
+                <a:solidFill>
+                  <a:schemeClr val="accent6">
+                    <a:lumMod val="50000"/>
+                  </a:schemeClr>
+                </a:solidFill>
+              </a:rPr>
+              <a:t>//</a:t>
+            </a:r>
+            <a:r>
+              <a:rPr lang="nl-NL" sz="2600" b="1" dirty="0" err="1" smtClean="0">
+                <a:solidFill>
+                  <a:schemeClr val="accent6">
+                    <a:lumMod val="50000"/>
+                  </a:schemeClr>
+                </a:solidFill>
+              </a:rPr>
+              <a:t>Use</a:t>
+            </a:r>
+            <a:r>
+              <a:rPr lang="nl-NL" sz="2600" b="1" dirty="0" smtClean="0">
+                <a:solidFill>
+                  <a:schemeClr val="accent6">
+                    <a:lumMod val="50000"/>
+                  </a:schemeClr>
+                </a:solidFill>
+              </a:rPr>
+              <a:t> </a:t>
+            </a:r>
+            <a:r>
+              <a:rPr lang="nl-NL" sz="2600" b="1" dirty="0" err="1" smtClean="0">
+                <a:solidFill>
+                  <a:srgbClr val="C00000"/>
+                </a:solidFill>
+              </a:rPr>
+              <a:t>subscribe</a:t>
+            </a:r>
+            <a:r>
+              <a:rPr lang="nl-NL" sz="2600" b="1" dirty="0" smtClean="0">
+                <a:solidFill>
+                  <a:srgbClr val="C00000"/>
+                </a:solidFill>
+              </a:rPr>
+              <a:t> </a:t>
+            </a:r>
+            <a:r>
+              <a:rPr lang="nl-NL" sz="2600" b="1" dirty="0" err="1" smtClean="0">
+                <a:solidFill>
+                  <a:schemeClr val="accent6">
+                    <a:lumMod val="50000"/>
+                  </a:schemeClr>
+                </a:solidFill>
+              </a:rPr>
+              <a:t>when</a:t>
+            </a:r>
+            <a:r>
+              <a:rPr lang="nl-NL" sz="2600" b="1" dirty="0" smtClean="0">
+                <a:solidFill>
+                  <a:schemeClr val="accent6">
+                    <a:lumMod val="50000"/>
+                  </a:schemeClr>
+                </a:solidFill>
+              </a:rPr>
+              <a:t> </a:t>
+            </a:r>
+            <a:r>
+              <a:rPr lang="nl-NL" sz="2600" b="1" dirty="0" err="1" smtClean="0">
+                <a:solidFill>
+                  <a:schemeClr val="accent6">
+                    <a:lumMod val="50000"/>
+                  </a:schemeClr>
+                </a:solidFill>
+              </a:rPr>
+              <a:t>Observable</a:t>
+            </a:r>
+            <a:r>
+              <a:rPr lang="nl-NL" sz="2600" b="1" dirty="0" smtClean="0">
+                <a:solidFill>
+                  <a:schemeClr val="accent6">
+                    <a:lumMod val="50000"/>
+                  </a:schemeClr>
+                </a:solidFill>
+              </a:rPr>
+              <a:t> : </a:t>
+            </a:r>
+          </a:p>
+          <a:p>
+            <a:pPr marL="914400" lvl="2" indent="0">
+              <a:buNone/>
+            </a:pPr>
+            <a:r>
+              <a:rPr lang="nl-NL" sz="2600" b="1" dirty="0" smtClean="0">
+                <a:solidFill>
+                  <a:schemeClr val="accent6">
+                    <a:lumMod val="50000"/>
+                  </a:schemeClr>
+                </a:solidFill>
+              </a:rPr>
+              <a:t>// </a:t>
+            </a:r>
+            <a:r>
+              <a:rPr lang="nl-NL" sz="2600" b="1" dirty="0" err="1" smtClean="0">
+                <a:solidFill>
+                  <a:schemeClr val="accent6">
+                    <a:lumMod val="50000"/>
+                  </a:schemeClr>
+                </a:solidFill>
+              </a:rPr>
+              <a:t>this.appService.getBooks</a:t>
+            </a:r>
+            <a:r>
+              <a:rPr lang="nl-NL" sz="2600" b="1" dirty="0">
+                <a:solidFill>
+                  <a:schemeClr val="accent6">
+                    <a:lumMod val="50000"/>
+                  </a:schemeClr>
+                </a:solidFill>
+              </a:rPr>
+              <a:t>()</a:t>
+            </a:r>
+            <a:r>
+              <a:rPr lang="nl-NL" sz="3200" b="1" dirty="0">
+                <a:solidFill>
+                  <a:srgbClr val="C00000"/>
+                </a:solidFill>
+              </a:rPr>
+              <a:t>.</a:t>
+            </a:r>
+            <a:r>
+              <a:rPr lang="nl-NL" sz="3200" b="1" dirty="0" err="1">
+                <a:solidFill>
+                  <a:srgbClr val="C00000"/>
+                </a:solidFill>
+              </a:rPr>
+              <a:t>subscribe</a:t>
+            </a:r>
+            <a:r>
+              <a:rPr lang="nl-NL" sz="2600" b="1" dirty="0">
+                <a:solidFill>
+                  <a:schemeClr val="accent6">
+                    <a:lumMod val="50000"/>
+                  </a:schemeClr>
+                </a:solidFill>
+              </a:rPr>
+              <a:t>(</a:t>
+            </a:r>
+            <a:r>
+              <a:rPr lang="nl-NL" sz="2600" b="1" dirty="0" err="1">
+                <a:solidFill>
+                  <a:schemeClr val="accent6">
+                    <a:lumMod val="50000"/>
+                  </a:schemeClr>
+                </a:solidFill>
+              </a:rPr>
+              <a:t>bks</a:t>
+            </a:r>
+            <a:r>
+              <a:rPr lang="nl-NL" sz="2600" b="1" dirty="0">
+                <a:solidFill>
+                  <a:schemeClr val="accent6">
+                    <a:lumMod val="50000"/>
+                  </a:schemeClr>
+                </a:solidFill>
+              </a:rPr>
+              <a:t> =&gt; </a:t>
+            </a:r>
+            <a:r>
+              <a:rPr lang="nl-NL" sz="2600" b="1" dirty="0" err="1">
+                <a:solidFill>
+                  <a:schemeClr val="accent6">
+                    <a:lumMod val="50000"/>
+                  </a:schemeClr>
+                </a:solidFill>
+              </a:rPr>
+              <a:t>this.books</a:t>
+            </a:r>
+            <a:r>
+              <a:rPr lang="nl-NL" sz="2600" b="1" dirty="0">
+                <a:solidFill>
+                  <a:schemeClr val="accent6">
+                    <a:lumMod val="50000"/>
+                  </a:schemeClr>
+                </a:solidFill>
+              </a:rPr>
+              <a:t> = </a:t>
+            </a:r>
+            <a:r>
+              <a:rPr lang="nl-NL" sz="2600" b="1" dirty="0" err="1">
+                <a:solidFill>
+                  <a:schemeClr val="accent6">
+                    <a:lumMod val="50000"/>
+                  </a:schemeClr>
+                </a:solidFill>
+              </a:rPr>
+              <a:t>bks</a:t>
+            </a:r>
+            <a:r>
+              <a:rPr lang="nl-NL" sz="2600" b="1" dirty="0">
+                <a:solidFill>
+                  <a:schemeClr val="accent6">
+                    <a:lumMod val="50000"/>
+                  </a:schemeClr>
+                </a:solidFill>
+              </a:rPr>
+              <a:t>);</a:t>
+            </a:r>
+          </a:p>
+          <a:p>
+            <a:pPr marL="914400" lvl="2" indent="0">
+              <a:buNone/>
+            </a:pPr>
+            <a:endParaRPr lang="nl-NL" sz="2600" dirty="0" smtClean="0"/>
+          </a:p>
+          <a:p>
+            <a:pPr marL="914400" lvl="2" indent="0">
+              <a:buNone/>
+            </a:pPr>
+            <a:endParaRPr lang="nl-NL" sz="2600" dirty="0"/>
+          </a:p>
+          <a:p>
+            <a:pPr marL="914400" lvl="2" indent="0">
+              <a:buNone/>
+            </a:pPr>
+            <a:r>
+              <a:rPr lang="nl-NL" sz="2600" b="1" dirty="0" err="1" smtClean="0">
+                <a:solidFill>
+                  <a:srgbClr val="C00000"/>
+                </a:solidFill>
+              </a:rPr>
+              <a:t>ngOnInit</a:t>
+            </a:r>
+            <a:r>
+              <a:rPr lang="nl-NL" sz="2600" dirty="0"/>
+              <a:t>(){</a:t>
+            </a:r>
+          </a:p>
+          <a:p>
+            <a:pPr marL="914400" lvl="2" indent="0">
+              <a:buNone/>
+            </a:pPr>
+            <a:r>
+              <a:rPr lang="nl-NL" sz="2600" dirty="0"/>
+              <a:t>    </a:t>
+            </a:r>
+            <a:r>
+              <a:rPr lang="nl-NL" sz="2600" b="1" dirty="0" err="1" smtClean="0">
+                <a:solidFill>
+                  <a:schemeClr val="accent2"/>
+                </a:solidFill>
+              </a:rPr>
+              <a:t>this.getBooks</a:t>
+            </a:r>
+            <a:r>
+              <a:rPr lang="nl-NL" sz="2600" b="1" dirty="0" smtClean="0">
+                <a:solidFill>
+                  <a:schemeClr val="accent2"/>
+                </a:solidFill>
+              </a:rPr>
+              <a:t>();</a:t>
+            </a:r>
+            <a:endParaRPr lang="nl-NL" sz="2600" dirty="0"/>
+          </a:p>
+          <a:p>
+            <a:pPr marL="914400" lvl="2" indent="0">
+              <a:buNone/>
+            </a:pPr>
+            <a:r>
+              <a:rPr lang="nl-NL" sz="2600" dirty="0"/>
+              <a:t>  </a:t>
+            </a:r>
+            <a:r>
+              <a:rPr lang="nl-NL" sz="2600" dirty="0" smtClean="0"/>
+              <a:t>};</a:t>
+            </a:r>
+            <a:endParaRPr lang="nl-NL" sz="2600" dirty="0"/>
+          </a:p>
+          <a:p>
+            <a:pPr marL="0" indent="0">
+              <a:buNone/>
+            </a:pPr>
+            <a:r>
+              <a:rPr lang="nl-NL" dirty="0" smtClean="0"/>
+              <a:t>}</a:t>
+            </a:r>
+            <a:endParaRPr lang="nl-NL" dirty="0"/>
+          </a:p>
+        </p:txBody>
+      </p:sp>
+    </p:spTree>
+    <p:extLst>
+      <p:ext uri="{BB962C8B-B14F-4D97-AF65-F5344CB8AC3E}">
+        <p14:creationId xmlns:p14="http://schemas.microsoft.com/office/powerpoint/2010/main" val="1424609616"/>
+      </p:ext>
+    </p:extLst>
+  </p:cSld>
+  <p:clrMapOvr>
+    <a:masterClrMapping/>
+  </p:clrMapOvr>
+  <p:timing>
+    <p:tnLst>
+      <p:par>
+        <p:cTn id="1" dur="indefinite" restart="never" nodeType="tmRoot"/>
+      </p:par>
+    </p:tnLst>
+  </p:timing>
+</p:sld>
+</file>
+
+<file path=ppt/slides/slide31.xml><?xml version="1.0" encoding="utf-8"?>
+<p:sld xmlns:a="http://schemas.openxmlformats.org/drawingml/2006/main" xmlns:r="http://schemas.openxmlformats.org/officeDocument/2006/relationships" xmlns:p="http://schemas.openxmlformats.org/presentationml/2006/main">
+  <p:cSld>
+    <p:spTree>
+      <p:nvGrpSpPr>
+        <p:cNvPr id="1" name=""/>
+        <p:cNvGrpSpPr/>
+        <p:nvPr/>
+      </p:nvGrpSpPr>
+      <p:grpSpPr>
+        <a:xfrm>
+          <a:off x="0" y="0"/>
+          <a:ext cx="0" cy="0"/>
+          <a:chOff x="0" y="0"/>
+          <a:chExt cx="0" cy="0"/>
+        </a:xfrm>
+      </p:grpSpPr>
+      <p:sp>
+        <p:nvSpPr>
+          <p:cNvPr id="2" name="Titel 1"/>
+          <p:cNvSpPr>
+            <a:spLocks noGrp="1"/>
+          </p:cNvSpPr>
+          <p:nvPr>
+            <p:ph type="title"/>
+          </p:nvPr>
+        </p:nvSpPr>
+        <p:spPr/>
+        <p:txBody>
+          <a:bodyPr/>
+          <a:lstStyle/>
+          <a:p>
+            <a:pPr algn="ctr"/>
+            <a:r>
+              <a:rPr lang="nl-NL" b="1" dirty="0" err="1" smtClean="0">
+                <a:solidFill>
+                  <a:srgbClr val="FFC000"/>
+                </a:solidFill>
+              </a:rPr>
+              <a:t>Getting</a:t>
+            </a:r>
+            <a:r>
+              <a:rPr lang="nl-NL" b="1" dirty="0" smtClean="0">
+                <a:solidFill>
+                  <a:srgbClr val="FFC000"/>
+                </a:solidFill>
+              </a:rPr>
+              <a:t> </a:t>
+            </a:r>
+            <a:r>
+              <a:rPr lang="nl-NL" b="1" dirty="0" err="1" smtClean="0">
+                <a:solidFill>
+                  <a:srgbClr val="FFC000"/>
+                </a:solidFill>
+              </a:rPr>
+              <a:t>started</a:t>
+            </a:r>
+            <a:endParaRPr lang="nl-NL" b="1" dirty="0">
+              <a:solidFill>
+                <a:srgbClr val="FFC000"/>
+              </a:solidFill>
+            </a:endParaRPr>
+          </a:p>
+        </p:txBody>
+      </p:sp>
+      <p:sp>
+        <p:nvSpPr>
+          <p:cNvPr id="4" name="Rectangle 1"/>
+          <p:cNvSpPr>
+            <a:spLocks noGrp="1" noChangeArrowheads="1"/>
+          </p:cNvSpPr>
+          <p:nvPr>
+            <p:ph idx="1"/>
+          </p:nvPr>
+        </p:nvSpPr>
+        <p:spPr bwMode="auto">
+          <a:xfrm>
+            <a:off x="593124" y="1515864"/>
+            <a:ext cx="11232291" cy="4493538"/>
+          </a:xfrm>
+          <a:prstGeom prst="rect">
+            <a:avLst/>
+          </a:prstGeom>
+          <a:noFill/>
+          <a:ln>
+            <a:noFill/>
+          </a:ln>
+          <a:effectLst/>
+          <a:extLst>
+            <a:ext uri="{909E8E84-426E-40DD-AFC4-6F175D3DCCD1}">
+              <a14:hiddenFill xmlns:a14="http://schemas.microsoft.com/office/drawing/2010/main">
+                <a:solidFill>
+                  <a:schemeClr val="accent1"/>
+                </a:solidFill>
+              </a14:hiddenFill>
+            </a:ext>
+            <a:ext uri="{91240B29-F687-4F45-9708-019B960494DF}">
+              <a14:hiddenLine xmlns:a14="http://schemas.microsoft.com/office/drawing/2010/main" w="9525">
+                <a:solidFill>
+                  <a:schemeClr val="tx1"/>
+                </a:solidFill>
+                <a:miter lim="800000"/>
+                <a:headEnd/>
+                <a:tailEnd/>
+              </a14:hiddenLine>
+            </a:ext>
+            <a:ext uri="{AF507438-7753-43E0-B8FC-AC1667EBCBE1}">
+              <a14:hiddenEffects xmlns:a14="http://schemas.microsoft.com/office/drawing/2010/main">
+                <a:effectLst>
+                  <a:outerShdw dist="35921" dir="2700000" algn="ctr" rotWithShape="0">
+                    <a:schemeClr val="bg2"/>
+                  </a:outerShdw>
+                </a:effectLst>
+              </a14:hiddenEffects>
+            </a:ext>
+          </a:extLst>
+        </p:spPr>
+        <p:txBody>
+          <a:bodyPr vert="horz" wrap="square" lIns="0" tIns="0" rIns="0" bIns="0" numCol="1" anchor="ctr" anchorCtr="0" compatLnSpc="1">
+            <a:prstTxWarp prst="textNoShape">
+              <a:avLst/>
+            </a:prstTxWarp>
+            <a:spAutoFit/>
+          </a:bodyPr>
+          <a:lstStyle>
+            <a:lvl1pPr eaLnBrk="0" fontAlgn="base" hangingPunct="0">
+              <a:spcBef>
+                <a:spcPct val="0"/>
+              </a:spcBef>
+              <a:spcAft>
+                <a:spcPct val="0"/>
+              </a:spcAft>
+              <a:defRPr>
+                <a:solidFill>
+                  <a:schemeClr val="tx1"/>
+                </a:solidFill>
+                <a:latin typeface="Arial" panose="020B0604020202020204" pitchFamily="34" charset="0"/>
+              </a:defRPr>
+            </a:lvl1pPr>
+            <a:lvl2pPr eaLnBrk="0" fontAlgn="base" hangingPunct="0">
+              <a:spcBef>
+                <a:spcPct val="0"/>
+              </a:spcBef>
+              <a:spcAft>
+                <a:spcPct val="0"/>
+              </a:spcAft>
+              <a:defRPr>
+                <a:solidFill>
+                  <a:schemeClr val="tx1"/>
+                </a:solidFill>
+                <a:latin typeface="Arial" panose="020B0604020202020204" pitchFamily="34" charset="0"/>
+              </a:defRPr>
+            </a:lvl2pPr>
+            <a:lvl3pPr eaLnBrk="0" fontAlgn="base" hangingPunct="0">
+              <a:spcBef>
+                <a:spcPct val="0"/>
+              </a:spcBef>
+              <a:spcAft>
+                <a:spcPct val="0"/>
+              </a:spcAft>
+              <a:defRPr>
+                <a:solidFill>
+                  <a:schemeClr val="tx1"/>
+                </a:solidFill>
+                <a:latin typeface="Arial" panose="020B0604020202020204" pitchFamily="34" charset="0"/>
+              </a:defRPr>
+            </a:lvl3pPr>
+            <a:lvl4pPr eaLnBrk="0" fontAlgn="base" hangingPunct="0">
+              <a:spcBef>
+                <a:spcPct val="0"/>
+              </a:spcBef>
+              <a:spcAft>
+                <a:spcPct val="0"/>
+              </a:spcAft>
+              <a:defRPr>
+                <a:solidFill>
+                  <a:schemeClr val="tx1"/>
+                </a:solidFill>
+                <a:latin typeface="Arial" panose="020B0604020202020204" pitchFamily="34" charset="0"/>
+              </a:defRPr>
+            </a:lvl4pPr>
+            <a:lvl5pPr eaLnBrk="0" fontAlgn="base" hangingPunct="0">
+              <a:spcBef>
+                <a:spcPct val="0"/>
+              </a:spcBef>
+              <a:spcAft>
+                <a:spcPct val="0"/>
+              </a:spcAft>
+              <a:defRPr>
+                <a:solidFill>
+                  <a:schemeClr val="tx1"/>
+                </a:solidFill>
+                <a:latin typeface="Arial" panose="020B0604020202020204" pitchFamily="34" charset="0"/>
+              </a:defRPr>
+            </a:lvl5pPr>
+            <a:lvl6pPr eaLnBrk="0" fontAlgn="base" hangingPunct="0">
+              <a:spcBef>
+                <a:spcPct val="0"/>
+              </a:spcBef>
+              <a:spcAft>
+                <a:spcPct val="0"/>
+              </a:spcAft>
+              <a:defRPr>
+                <a:solidFill>
+                  <a:schemeClr val="tx1"/>
+                </a:solidFill>
+                <a:latin typeface="Arial" panose="020B0604020202020204" pitchFamily="34" charset="0"/>
+              </a:defRPr>
+            </a:lvl6pPr>
+            <a:lvl7pPr eaLnBrk="0" fontAlgn="base" hangingPunct="0">
+              <a:spcBef>
+                <a:spcPct val="0"/>
+              </a:spcBef>
+              <a:spcAft>
+                <a:spcPct val="0"/>
+              </a:spcAft>
+              <a:defRPr>
+                <a:solidFill>
+                  <a:schemeClr val="tx1"/>
+                </a:solidFill>
+                <a:latin typeface="Arial" panose="020B0604020202020204" pitchFamily="34" charset="0"/>
+              </a:defRPr>
+            </a:lvl7pPr>
+            <a:lvl8pPr eaLnBrk="0" fontAlgn="base" hangingPunct="0">
+              <a:spcBef>
+                <a:spcPct val="0"/>
+              </a:spcBef>
+              <a:spcAft>
+                <a:spcPct val="0"/>
+              </a:spcAft>
+              <a:defRPr>
+                <a:solidFill>
+                  <a:schemeClr val="tx1"/>
+                </a:solidFill>
+                <a:latin typeface="Arial" panose="020B0604020202020204" pitchFamily="34" charset="0"/>
+              </a:defRPr>
+            </a:lvl8pPr>
+            <a:lvl9pPr eaLnBrk="0" fontAlgn="base" hangingPunct="0">
+              <a:spcBef>
+                <a:spcPct val="0"/>
+              </a:spcBef>
+              <a:spcAft>
+                <a:spcPct val="0"/>
+              </a:spcAft>
+              <a:defRPr>
+                <a:solidFill>
+                  <a:schemeClr val="tx1"/>
+                </a:solidFill>
+                <a:latin typeface="Arial" panose="020B0604020202020204" pitchFamily="34" charset="0"/>
+              </a:defRPr>
+            </a:lvl9pPr>
+          </a:lstStyle>
+          <a:p>
+            <a:pPr marL="0" lvl="0" indent="0">
+              <a:lnSpc>
+                <a:spcPct val="100000"/>
+              </a:lnSpc>
+              <a:buNone/>
+            </a:pPr>
+            <a:r>
+              <a:rPr lang="en-US" altLang="nl-NL" sz="2400" dirty="0" smtClean="0">
+                <a:latin typeface="+mn-lt"/>
+              </a:rPr>
+              <a:t>Download:  </a:t>
+            </a:r>
+            <a:r>
+              <a:rPr lang="en-US" altLang="nl-NL" b="1" dirty="0" smtClean="0">
+                <a:solidFill>
+                  <a:srgbClr val="FF0000"/>
+                </a:solidFill>
+                <a:latin typeface="+mn-lt"/>
+              </a:rPr>
+              <a:t>https</a:t>
+            </a:r>
+            <a:r>
+              <a:rPr lang="en-US" altLang="nl-NL" b="1" dirty="0">
+                <a:solidFill>
+                  <a:srgbClr val="FF0000"/>
+                </a:solidFill>
+                <a:latin typeface="+mn-lt"/>
+              </a:rPr>
+              <a:t>://</a:t>
+            </a:r>
+            <a:r>
+              <a:rPr lang="en-US" altLang="nl-NL" b="1" dirty="0" err="1">
+                <a:solidFill>
+                  <a:srgbClr val="FF0000"/>
+                </a:solidFill>
+                <a:latin typeface="+mn-lt"/>
+              </a:rPr>
+              <a:t>github.com</a:t>
+            </a:r>
+            <a:r>
+              <a:rPr lang="en-US" altLang="nl-NL" b="1" dirty="0">
+                <a:solidFill>
+                  <a:srgbClr val="FF0000"/>
+                </a:solidFill>
+                <a:latin typeface="+mn-lt"/>
+              </a:rPr>
+              <a:t>/petereijgermans11/workshop-</a:t>
+            </a:r>
+            <a:r>
+              <a:rPr lang="en-US" altLang="nl-NL" b="1" dirty="0" err="1">
+                <a:solidFill>
+                  <a:srgbClr val="FF0000"/>
+                </a:solidFill>
+                <a:latin typeface="+mn-lt"/>
+              </a:rPr>
+              <a:t>reactjs</a:t>
+            </a:r>
+            <a:r>
+              <a:rPr lang="en-US" altLang="nl-NL" b="1" dirty="0">
+                <a:solidFill>
+                  <a:srgbClr val="FF0000"/>
+                </a:solidFill>
+                <a:latin typeface="+mn-lt"/>
+              </a:rPr>
+              <a:t>-angular</a:t>
+            </a:r>
+            <a:endParaRPr lang="en-US" altLang="nl-NL" b="1" dirty="0" smtClean="0">
+              <a:solidFill>
+                <a:srgbClr val="FF0000"/>
+              </a:solidFill>
+              <a:latin typeface="+mn-lt"/>
+            </a:endParaRPr>
+          </a:p>
+          <a:p>
+            <a:pPr marL="0" lvl="0" indent="0">
+              <a:lnSpc>
+                <a:spcPct val="100000"/>
+              </a:lnSpc>
+              <a:buNone/>
+            </a:pPr>
+            <a:endParaRPr lang="en-US" altLang="nl-NL" sz="2400" b="1" dirty="0" smtClean="0">
+              <a:latin typeface="+mn-lt"/>
+            </a:endParaRPr>
+          </a:p>
+          <a:p>
+            <a:pPr marL="0" lvl="0" indent="0">
+              <a:lnSpc>
+                <a:spcPct val="100000"/>
+              </a:lnSpc>
+              <a:buNone/>
+            </a:pPr>
+            <a:r>
+              <a:rPr lang="en-US" altLang="nl-NL" sz="2400" dirty="0" smtClean="0">
+                <a:latin typeface="+mn-lt"/>
+              </a:rPr>
+              <a:t>    </a:t>
+            </a:r>
+            <a:endParaRPr lang="en-US" altLang="nl-NL" sz="2400" dirty="0">
+              <a:latin typeface="+mn-lt"/>
+            </a:endParaRPr>
+          </a:p>
+          <a:p>
+            <a:pPr marL="0" lvl="0" indent="0">
+              <a:lnSpc>
+                <a:spcPct val="100000"/>
+              </a:lnSpc>
+              <a:buNone/>
+            </a:pPr>
+            <a:r>
+              <a:rPr lang="en-US" altLang="nl-NL" sz="2400" dirty="0">
+                <a:latin typeface="+mn-lt"/>
+              </a:rPr>
+              <a:t>Bootstrap your application: </a:t>
+            </a:r>
+            <a:r>
+              <a:rPr lang="en-US" altLang="nl-NL" sz="2400" dirty="0" smtClean="0">
+                <a:latin typeface="+mn-lt"/>
+              </a:rPr>
+              <a:t> </a:t>
+            </a:r>
+            <a:r>
+              <a:rPr lang="en-US" sz="2400" b="1" dirty="0"/>
+              <a:t>cd ./angular </a:t>
+            </a:r>
+            <a:endParaRPr lang="en-US" sz="2400" b="1" dirty="0" smtClean="0"/>
+          </a:p>
+          <a:p>
+            <a:pPr marL="0" lvl="0" indent="0">
+              <a:lnSpc>
+                <a:spcPct val="100000"/>
+              </a:lnSpc>
+              <a:buNone/>
+            </a:pPr>
+            <a:r>
+              <a:rPr lang="en-US" sz="2400" dirty="0"/>
+              <a:t> </a:t>
+            </a:r>
+            <a:r>
+              <a:rPr lang="en-US" sz="2400" dirty="0" smtClean="0"/>
+              <a:t>                                         </a:t>
+            </a:r>
+            <a:r>
+              <a:rPr lang="en-US" sz="2400" b="1" dirty="0" smtClean="0"/>
+              <a:t>yarn </a:t>
+            </a:r>
+            <a:r>
+              <a:rPr lang="en-US" sz="2400" b="1" dirty="0"/>
+              <a:t>start</a:t>
+            </a:r>
+            <a:endParaRPr lang="en-US" altLang="nl-NL" sz="2400" b="1" dirty="0" smtClean="0">
+              <a:latin typeface="+mn-lt"/>
+            </a:endParaRPr>
+          </a:p>
+          <a:p>
+            <a:pPr marL="0" lvl="0" indent="0">
+              <a:lnSpc>
+                <a:spcPct val="100000"/>
+              </a:lnSpc>
+              <a:buNone/>
+            </a:pPr>
+            <a:endParaRPr lang="en-US" altLang="nl-NL" sz="2400" dirty="0" smtClean="0">
+              <a:latin typeface="+mn-lt"/>
+            </a:endParaRPr>
+          </a:p>
+          <a:p>
+            <a:pPr marL="0" lvl="0" indent="0">
+              <a:lnSpc>
+                <a:spcPct val="100000"/>
+              </a:lnSpc>
+              <a:buNone/>
+            </a:pPr>
+            <a:endParaRPr lang="en-US" altLang="nl-NL" sz="2400" dirty="0">
+              <a:latin typeface="+mn-lt"/>
+            </a:endParaRPr>
+          </a:p>
+          <a:p>
+            <a:pPr marL="0" lvl="0" indent="0">
+              <a:lnSpc>
+                <a:spcPct val="100000"/>
+              </a:lnSpc>
+              <a:buNone/>
+            </a:pPr>
+            <a:r>
+              <a:rPr lang="en-US" altLang="nl-NL" sz="2400" dirty="0">
+                <a:latin typeface="+mn-lt"/>
+              </a:rPr>
+              <a:t>!oops</a:t>
+            </a:r>
+          </a:p>
+          <a:p>
+            <a:pPr marL="0" lvl="0" indent="0">
+              <a:lnSpc>
+                <a:spcPct val="100000"/>
+              </a:lnSpc>
+              <a:buNone/>
+            </a:pPr>
+            <a:endParaRPr lang="en-US" altLang="nl-NL" sz="2400" dirty="0">
+              <a:latin typeface="+mn-lt"/>
+            </a:endParaRPr>
+          </a:p>
+          <a:p>
+            <a:pPr marL="0" lvl="0" indent="0">
+              <a:lnSpc>
+                <a:spcPct val="100000"/>
+              </a:lnSpc>
+              <a:buNone/>
+            </a:pPr>
+            <a:r>
+              <a:rPr lang="en-US" altLang="nl-NL" sz="2400" dirty="0">
+                <a:latin typeface="+mn-lt"/>
+              </a:rPr>
+              <a:t>This application doesn't work </a:t>
+            </a:r>
+            <a:r>
+              <a:rPr lang="en-US" altLang="nl-NL" sz="2400" dirty="0" smtClean="0">
+                <a:latin typeface="+mn-lt"/>
+              </a:rPr>
+              <a:t>:(</a:t>
+            </a:r>
+          </a:p>
+          <a:p>
+            <a:pPr marL="0" lvl="0" indent="0">
+              <a:lnSpc>
+                <a:spcPct val="100000"/>
+              </a:lnSpc>
+              <a:buNone/>
+            </a:pPr>
+            <a:endParaRPr kumimoji="0" lang="en-US" altLang="nl-NL" sz="2400" b="0" i="0" u="none" strike="noStrike" cap="none" normalizeH="0" baseline="0" dirty="0">
+              <a:ln>
+                <a:noFill/>
+              </a:ln>
+              <a:solidFill>
+                <a:schemeClr val="tx1"/>
+              </a:solidFill>
+              <a:effectLst/>
+              <a:latin typeface="+mn-lt"/>
+            </a:endParaRPr>
+          </a:p>
+          <a:p>
+            <a:pPr marL="0" lvl="0" indent="0">
+              <a:lnSpc>
+                <a:spcPct val="100000"/>
+              </a:lnSpc>
+              <a:buNone/>
+            </a:pPr>
+            <a:r>
+              <a:rPr lang="en-US" altLang="nl-NL" sz="2400" b="1" dirty="0">
+                <a:latin typeface="+mn-lt"/>
+              </a:rPr>
+              <a:t>See </a:t>
+            </a:r>
+            <a:r>
+              <a:rPr lang="en-US" altLang="nl-NL" sz="2400" b="1" dirty="0" smtClean="0">
+                <a:latin typeface="+mn-lt"/>
+              </a:rPr>
+              <a:t>tutorial to fix the problems:  </a:t>
+            </a:r>
+            <a:r>
+              <a:rPr lang="en-US" altLang="nl-NL" sz="2400" b="1" dirty="0">
+                <a:solidFill>
+                  <a:srgbClr val="FF0000"/>
+                </a:solidFill>
+                <a:latin typeface="+mn-lt"/>
+              </a:rPr>
+              <a:t>https://</a:t>
+            </a:r>
+            <a:r>
+              <a:rPr lang="en-US" altLang="nl-NL" sz="2400" b="1" dirty="0" err="1">
+                <a:solidFill>
+                  <a:srgbClr val="FF0000"/>
+                </a:solidFill>
+                <a:latin typeface="+mn-lt"/>
+              </a:rPr>
+              <a:t>angular.io</a:t>
+            </a:r>
+            <a:r>
+              <a:rPr lang="en-US" altLang="nl-NL" sz="2400" b="1" dirty="0">
+                <a:solidFill>
+                  <a:srgbClr val="FF0000"/>
+                </a:solidFill>
+                <a:latin typeface="+mn-lt"/>
+              </a:rPr>
+              <a:t>/tutorial/toh-pt6</a:t>
+            </a:r>
+            <a:endParaRPr kumimoji="0" lang="nl-NL" altLang="nl-NL" sz="2400" b="1" i="0" u="none" strike="noStrike" cap="none" normalizeH="0" baseline="0" dirty="0" smtClean="0">
+              <a:ln>
+                <a:noFill/>
+              </a:ln>
+              <a:solidFill>
+                <a:srgbClr val="FF0000"/>
+              </a:solidFill>
+              <a:effectLst/>
+              <a:latin typeface="+mn-lt"/>
+            </a:endParaRPr>
+          </a:p>
+        </p:txBody>
+      </p:sp>
+    </p:spTree>
+    <p:extLst>
+      <p:ext uri="{BB962C8B-B14F-4D97-AF65-F5344CB8AC3E}">
+        <p14:creationId xmlns:p14="http://schemas.microsoft.com/office/powerpoint/2010/main" val="656802931"/>
       </p:ext>
     </p:extLst>
   </p:cSld>

</xml_diff>